<commit_message>
more debug , fixed list slides,
</commit_message>
<xml_diff>
--- a/HowTo-presentation.pptx
+++ b/HowTo-presentation.pptx
@@ -5937,9 +5937,6 @@
             <a:pPr lvl="0"/>
             <a:r>
               <a:rPr lang="en-US"/>
-            </a:r>
-            <a:r>
-              <a:rPr lang="en-US"/>
               <a:t>curl -s "https://get.sdkman.io" | bash</a:t>
             </a:r>
           </a:p>
@@ -5947,9 +5944,6 @@
             <a:pPr lvl="0"/>
             <a:r>
               <a:rPr lang="en-US"/>
-            </a:r>
-            <a:r>
-              <a:rPr lang="en-US"/>
               <a:t>source "/home/ubuntu/.sdkman/bin/sdkman-init.sh"</a:t>
             </a:r>
           </a:p>
@@ -5957,9 +5951,6 @@
             <a:pPr lvl="0"/>
             <a:r>
               <a:rPr lang="en-US"/>
-            </a:r>
-            <a:r>
-              <a:rPr lang="en-US"/>
               <a:t>sdk install gradle</a:t>
             </a:r>
           </a:p>
@@ -5967,17 +5958,11 @@
             <a:pPr lvl="0"/>
             <a:r>
               <a:rPr lang="en-US"/>
-            </a:r>
-            <a:r>
-              <a:rPr lang="en-US"/>
               <a:t>sdk install java 11.0.22-tem</a:t>
             </a:r>
           </a:p>
           <a:p>
             <a:pPr lvl="0"/>
-            <a:r>
-              <a:rPr lang="en-US"/>
-            </a:r>
             <a:r>
               <a:rPr lang="en-US"/>
               <a:t>gradle init</a:t>
@@ -6051,9 +6036,6 @@
             <a:pPr lvl="0"/>
             <a:r>
               <a:rPr lang="en-US"/>
-            </a:r>
-            <a:r>
-              <a:rPr lang="en-US"/>
               <a:t>https://www.baeldung.com/apache-poi-slideshow</a:t>
             </a:r>
           </a:p>
@@ -6061,17 +6043,11 @@
             <a:pPr lvl="0"/>
             <a:r>
               <a:rPr lang="en-US"/>
-            </a:r>
-            <a:r>
-              <a:rPr lang="en-US"/>
               <a:t>shttps://poi.apache.org/components/slideshow/xslf-cookbook.html</a:t>
             </a:r>
           </a:p>
           <a:p>
             <a:pPr lvl="0"/>
-            <a:r>
-              <a:rPr lang="en-US"/>
-            </a:r>
             <a:r>
               <a:rPr lang="en-US"/>
               <a:t>https://github.com/eugenp/tutorials/blob/master/apache-poi-2/src/main/java/com/baeldung/poi/powerpoint/PowerPointHelper.java</a:t>
@@ -6404,9 +6380,6 @@
             <a:pPr lvl="0"/>
             <a:r>
               <a:rPr lang="en-US"/>
-            </a:r>
-            <a:r>
-              <a:rPr lang="en-US"/>
               <a:t>Element 1 </a:t>
             </a:r>
           </a:p>
@@ -6414,17 +6387,11 @@
             <a:pPr lvl="0"/>
             <a:r>
               <a:rPr lang="en-US"/>
-            </a:r>
-            <a:r>
-              <a:rPr lang="en-US"/>
               <a:t>Element 2</a:t>
             </a:r>
           </a:p>
           <a:p>
             <a:pPr lvl="0"/>
-            <a:r>
-              <a:rPr lang="en-US"/>
-            </a:r>
             <a:r>
               <a:rPr lang="en-US"/>
               <a:t>Element 3</a:t>

</xml_diff>

<commit_message>
use clean manually build template and add footer from code
</commit_message>
<xml_diff>
--- a/HowTo-presentation.pptx
+++ b/HowTo-presentation.pptx
@@ -16,7 +16,7 @@
     <p:sldId id="264" r:id="rId12"/>
     <p:sldId id="265" r:id="rId13"/>
   </p:sldIdLst>
-  <p:sldSz cx="10080625" cy="5670550"/>
+  <p:sldSz cx="10077450" cy="5668963"/>
   <p:notesSz cx="7559675" cy="10691813"/>
 </p:presentation>
 </file>
@@ -72,7 +72,7 @@
         <p:txBody>
           <a:bodyPr/>
           <a:p>
-            <a:fld id="{3763FDC7-3A52-4C86-B5E6-8688026612DE}" type="slidenum">
+            <a:fld id="{5669E41B-D5CD-4AD6-8082-CA2119CBB203}" type="slidenum">
               <a:t>&lt;#&gt;</a:t>
             </a:fld>
           </a:p>
@@ -123,7 +123,7 @@
       </p:grpSpPr>
       <p:sp>
         <p:nvSpPr>
-          <p:cNvPr id="29" name="PlaceHolder 1"/>
+          <p:cNvPr id="26" name="PlaceHolder 1"/>
           <p:cNvSpPr>
             <a:spLocks noGrp="1"/>
           </p:cNvSpPr>
@@ -133,8 +133,8 @@
         </p:nvSpPr>
         <p:spPr>
           <a:xfrm>
-            <a:off x="540000" y="180000"/>
-            <a:ext cx="8279280" cy="629280"/>
+            <a:off x="503640" y="225720"/>
+            <a:ext cx="9066240" cy="944280"/>
           </a:xfrm>
           <a:prstGeom prst="rect">
             <a:avLst/>
@@ -160,7 +160,7 @@
       </p:sp>
       <p:sp>
         <p:nvSpPr>
-          <p:cNvPr id="30" name="PlaceHolder 2"/>
+          <p:cNvPr id="27" name="PlaceHolder 2"/>
           <p:cNvSpPr>
             <a:spLocks noGrp="1"/>
           </p:cNvSpPr>
@@ -170,8 +170,8 @@
         </p:nvSpPr>
         <p:spPr>
           <a:xfrm>
-            <a:off x="504000" y="1326600"/>
-            <a:ext cx="9071640" cy="1568160"/>
+            <a:off x="503640" y="1326240"/>
+            <a:ext cx="9069120" cy="1567800"/>
           </a:xfrm>
           <a:prstGeom prst="rect">
             <a:avLst/>
@@ -194,7 +194,7 @@
       </p:sp>
       <p:sp>
         <p:nvSpPr>
-          <p:cNvPr id="31" name="PlaceHolder 3"/>
+          <p:cNvPr id="28" name="PlaceHolder 3"/>
           <p:cNvSpPr>
             <a:spLocks noGrp="1"/>
           </p:cNvSpPr>
@@ -204,8 +204,8 @@
         </p:nvSpPr>
         <p:spPr>
           <a:xfrm>
-            <a:off x="504000" y="3044160"/>
-            <a:ext cx="9071640" cy="1568160"/>
+            <a:off x="503640" y="3043440"/>
+            <a:ext cx="9069120" cy="1567800"/>
           </a:xfrm>
           <a:prstGeom prst="rect">
             <a:avLst/>
@@ -260,7 +260,7 @@
         <p:txBody>
           <a:bodyPr/>
           <a:p>
-            <a:fld id="{F55D9F60-30F8-43B4-A619-404B889F45FF}" type="slidenum">
+            <a:fld id="{730C8876-39BE-4A2E-B0EA-8786AF0DCC7A}" type="slidenum">
               <a:t>&lt;#&gt;</a:t>
             </a:fld>
           </a:p>
@@ -311,7 +311,7 @@
       </p:grpSpPr>
       <p:sp>
         <p:nvSpPr>
-          <p:cNvPr id="32" name="PlaceHolder 1"/>
+          <p:cNvPr id="29" name="PlaceHolder 1"/>
           <p:cNvSpPr>
             <a:spLocks noGrp="1"/>
           </p:cNvSpPr>
@@ -321,8 +321,8 @@
         </p:nvSpPr>
         <p:spPr>
           <a:xfrm>
-            <a:off x="540000" y="180000"/>
-            <a:ext cx="8279280" cy="629280"/>
+            <a:off x="503640" y="225720"/>
+            <a:ext cx="9066240" cy="944280"/>
           </a:xfrm>
           <a:prstGeom prst="rect">
             <a:avLst/>
@@ -348,7 +348,7 @@
       </p:sp>
       <p:sp>
         <p:nvSpPr>
-          <p:cNvPr id="33" name="PlaceHolder 2"/>
+          <p:cNvPr id="30" name="PlaceHolder 2"/>
           <p:cNvSpPr>
             <a:spLocks noGrp="1"/>
           </p:cNvSpPr>
@@ -358,8 +358,8 @@
         </p:nvSpPr>
         <p:spPr>
           <a:xfrm>
-            <a:off x="504000" y="1326600"/>
-            <a:ext cx="4426920" cy="1568160"/>
+            <a:off x="503640" y="1326240"/>
+            <a:ext cx="4425480" cy="1567800"/>
           </a:xfrm>
           <a:prstGeom prst="rect">
             <a:avLst/>
@@ -382,7 +382,7 @@
       </p:sp>
       <p:sp>
         <p:nvSpPr>
-          <p:cNvPr id="34" name="PlaceHolder 3"/>
+          <p:cNvPr id="31" name="PlaceHolder 3"/>
           <p:cNvSpPr>
             <a:spLocks noGrp="1"/>
           </p:cNvSpPr>
@@ -392,8 +392,8 @@
         </p:nvSpPr>
         <p:spPr>
           <a:xfrm>
-            <a:off x="5152680" y="1326600"/>
-            <a:ext cx="4426920" cy="1568160"/>
+            <a:off x="5150880" y="1326240"/>
+            <a:ext cx="4425480" cy="1567800"/>
           </a:xfrm>
           <a:prstGeom prst="rect">
             <a:avLst/>
@@ -416,7 +416,7 @@
       </p:sp>
       <p:sp>
         <p:nvSpPr>
-          <p:cNvPr id="35" name="PlaceHolder 4"/>
+          <p:cNvPr id="32" name="PlaceHolder 4"/>
           <p:cNvSpPr>
             <a:spLocks noGrp="1"/>
           </p:cNvSpPr>
@@ -426,8 +426,8 @@
         </p:nvSpPr>
         <p:spPr>
           <a:xfrm>
-            <a:off x="504000" y="3044160"/>
-            <a:ext cx="4426920" cy="1568160"/>
+            <a:off x="503640" y="3043440"/>
+            <a:ext cx="4425480" cy="1567800"/>
           </a:xfrm>
           <a:prstGeom prst="rect">
             <a:avLst/>
@@ -450,7 +450,7 @@
       </p:sp>
       <p:sp>
         <p:nvSpPr>
-          <p:cNvPr id="36" name="PlaceHolder 5"/>
+          <p:cNvPr id="33" name="PlaceHolder 5"/>
           <p:cNvSpPr>
             <a:spLocks noGrp="1"/>
           </p:cNvSpPr>
@@ -460,8 +460,8 @@
         </p:nvSpPr>
         <p:spPr>
           <a:xfrm>
-            <a:off x="5152680" y="3044160"/>
-            <a:ext cx="4426920" cy="1568160"/>
+            <a:off x="5150880" y="3043440"/>
+            <a:ext cx="4425480" cy="1567800"/>
           </a:xfrm>
           <a:prstGeom prst="rect">
             <a:avLst/>
@@ -516,7 +516,7 @@
         <p:txBody>
           <a:bodyPr/>
           <a:p>
-            <a:fld id="{78947E50-9D31-4113-A464-11A3031751F2}" type="slidenum">
+            <a:fld id="{6D29EEFA-5A8B-4A08-8504-A9AB415F096A}" type="slidenum">
               <a:t>&lt;#&gt;</a:t>
             </a:fld>
           </a:p>
@@ -567,7 +567,7 @@
       </p:grpSpPr>
       <p:sp>
         <p:nvSpPr>
-          <p:cNvPr id="37" name="PlaceHolder 1"/>
+          <p:cNvPr id="34" name="PlaceHolder 1"/>
           <p:cNvSpPr>
             <a:spLocks noGrp="1"/>
           </p:cNvSpPr>
@@ -577,8 +577,8 @@
         </p:nvSpPr>
         <p:spPr>
           <a:xfrm>
-            <a:off x="540000" y="180000"/>
-            <a:ext cx="8279280" cy="629280"/>
+            <a:off x="503640" y="225720"/>
+            <a:ext cx="9066240" cy="944280"/>
           </a:xfrm>
           <a:prstGeom prst="rect">
             <a:avLst/>
@@ -604,7 +604,7 @@
       </p:sp>
       <p:sp>
         <p:nvSpPr>
-          <p:cNvPr id="38" name="PlaceHolder 2"/>
+          <p:cNvPr id="35" name="PlaceHolder 2"/>
           <p:cNvSpPr>
             <a:spLocks noGrp="1"/>
           </p:cNvSpPr>
@@ -614,8 +614,8 @@
         </p:nvSpPr>
         <p:spPr>
           <a:xfrm>
-            <a:off x="504000" y="1326600"/>
-            <a:ext cx="2920680" cy="1568160"/>
+            <a:off x="503640" y="1326240"/>
+            <a:ext cx="2919960" cy="1567800"/>
           </a:xfrm>
           <a:prstGeom prst="rect">
             <a:avLst/>
@@ -638,7 +638,7 @@
       </p:sp>
       <p:sp>
         <p:nvSpPr>
-          <p:cNvPr id="39" name="PlaceHolder 3"/>
+          <p:cNvPr id="36" name="PlaceHolder 3"/>
           <p:cNvSpPr>
             <a:spLocks noGrp="1"/>
           </p:cNvSpPr>
@@ -648,8 +648,8 @@
         </p:nvSpPr>
         <p:spPr>
           <a:xfrm>
-            <a:off x="3571200" y="1326600"/>
-            <a:ext cx="2920680" cy="1568160"/>
+            <a:off x="3570120" y="1326240"/>
+            <a:ext cx="2919960" cy="1567800"/>
           </a:xfrm>
           <a:prstGeom prst="rect">
             <a:avLst/>
@@ -672,7 +672,7 @@
       </p:sp>
       <p:sp>
         <p:nvSpPr>
-          <p:cNvPr id="40" name="PlaceHolder 4"/>
+          <p:cNvPr id="37" name="PlaceHolder 4"/>
           <p:cNvSpPr>
             <a:spLocks noGrp="1"/>
           </p:cNvSpPr>
@@ -682,8 +682,8 @@
         </p:nvSpPr>
         <p:spPr>
           <a:xfrm>
-            <a:off x="6638040" y="1326600"/>
-            <a:ext cx="2920680" cy="1568160"/>
+            <a:off x="6636240" y="1326240"/>
+            <a:ext cx="2919960" cy="1567800"/>
           </a:xfrm>
           <a:prstGeom prst="rect">
             <a:avLst/>
@@ -706,7 +706,7 @@
       </p:sp>
       <p:sp>
         <p:nvSpPr>
-          <p:cNvPr id="41" name="PlaceHolder 5"/>
+          <p:cNvPr id="38" name="PlaceHolder 5"/>
           <p:cNvSpPr>
             <a:spLocks noGrp="1"/>
           </p:cNvSpPr>
@@ -716,8 +716,8 @@
         </p:nvSpPr>
         <p:spPr>
           <a:xfrm>
-            <a:off x="504000" y="3044160"/>
-            <a:ext cx="2920680" cy="1568160"/>
+            <a:off x="503640" y="3043440"/>
+            <a:ext cx="2919960" cy="1567800"/>
           </a:xfrm>
           <a:prstGeom prst="rect">
             <a:avLst/>
@@ -740,7 +740,7 @@
       </p:sp>
       <p:sp>
         <p:nvSpPr>
-          <p:cNvPr id="42" name="PlaceHolder 6"/>
+          <p:cNvPr id="39" name="PlaceHolder 6"/>
           <p:cNvSpPr>
             <a:spLocks noGrp="1"/>
           </p:cNvSpPr>
@@ -750,8 +750,8 @@
         </p:nvSpPr>
         <p:spPr>
           <a:xfrm>
-            <a:off x="3571200" y="3044160"/>
-            <a:ext cx="2920680" cy="1568160"/>
+            <a:off x="3570120" y="3043440"/>
+            <a:ext cx="2919960" cy="1567800"/>
           </a:xfrm>
           <a:prstGeom prst="rect">
             <a:avLst/>
@@ -774,7 +774,7 @@
       </p:sp>
       <p:sp>
         <p:nvSpPr>
-          <p:cNvPr id="43" name="PlaceHolder 7"/>
+          <p:cNvPr id="40" name="PlaceHolder 7"/>
           <p:cNvSpPr>
             <a:spLocks noGrp="1"/>
           </p:cNvSpPr>
@@ -784,8 +784,8 @@
         </p:nvSpPr>
         <p:spPr>
           <a:xfrm>
-            <a:off x="6638040" y="3044160"/>
-            <a:ext cx="2920680" cy="1568160"/>
+            <a:off x="6636240" y="3043440"/>
+            <a:ext cx="2919960" cy="1567800"/>
           </a:xfrm>
           <a:prstGeom prst="rect">
             <a:avLst/>
@@ -840,7 +840,7 @@
         <p:txBody>
           <a:bodyPr/>
           <a:p>
-            <a:fld id="{BDE49B9D-BDB7-4D8B-9C73-450C066F6314}" type="slidenum">
+            <a:fld id="{72580C91-7FDC-42B1-A34D-749E61D04E07}" type="slidenum">
               <a:t>&lt;#&gt;</a:t>
             </a:fld>
           </a:p>
@@ -891,7 +891,7 @@
       </p:grpSpPr>
       <p:sp>
         <p:nvSpPr>
-          <p:cNvPr id="8" name="PlaceHolder 1"/>
+          <p:cNvPr id="5" name="PlaceHolder 1"/>
           <p:cNvSpPr>
             <a:spLocks noGrp="1"/>
           </p:cNvSpPr>
@@ -901,8 +901,8 @@
         </p:nvSpPr>
         <p:spPr>
           <a:xfrm>
-            <a:off x="540000" y="180000"/>
-            <a:ext cx="8279280" cy="629280"/>
+            <a:off x="503640" y="225720"/>
+            <a:ext cx="9066240" cy="944280"/>
           </a:xfrm>
           <a:prstGeom prst="rect">
             <a:avLst/>
@@ -928,7 +928,7 @@
       </p:sp>
       <p:sp>
         <p:nvSpPr>
-          <p:cNvPr id="9" name="PlaceHolder 2"/>
+          <p:cNvPr id="6" name="PlaceHolder 2"/>
           <p:cNvSpPr>
             <a:spLocks noGrp="1"/>
           </p:cNvSpPr>
@@ -938,8 +938,8 @@
         </p:nvSpPr>
         <p:spPr>
           <a:xfrm>
-            <a:off x="504000" y="1326600"/>
-            <a:ext cx="9071640" cy="3288240"/>
+            <a:off x="503640" y="1326240"/>
+            <a:ext cx="9069120" cy="3287520"/>
           </a:xfrm>
           <a:prstGeom prst="rect">
             <a:avLst/>
@@ -997,7 +997,7 @@
         <p:txBody>
           <a:bodyPr/>
           <a:p>
-            <a:fld id="{F4CD7E4C-4F2E-4D39-857D-BEACCB010BFF}" type="slidenum">
+            <a:fld id="{AFADF256-7FC5-4EDD-B2FA-1AFD46748ABB}" type="slidenum">
               <a:t>&lt;#&gt;</a:t>
             </a:fld>
           </a:p>
@@ -1048,7 +1048,7 @@
       </p:grpSpPr>
       <p:sp>
         <p:nvSpPr>
-          <p:cNvPr id="10" name="PlaceHolder 1"/>
+          <p:cNvPr id="7" name="PlaceHolder 1"/>
           <p:cNvSpPr>
             <a:spLocks noGrp="1"/>
           </p:cNvSpPr>
@@ -1058,8 +1058,8 @@
         </p:nvSpPr>
         <p:spPr>
           <a:xfrm>
-            <a:off x="540000" y="180000"/>
-            <a:ext cx="8279280" cy="629280"/>
+            <a:off x="503640" y="225720"/>
+            <a:ext cx="9066240" cy="944280"/>
           </a:xfrm>
           <a:prstGeom prst="rect">
             <a:avLst/>
@@ -1085,7 +1085,7 @@
       </p:sp>
       <p:sp>
         <p:nvSpPr>
-          <p:cNvPr id="11" name="PlaceHolder 2"/>
+          <p:cNvPr id="8" name="PlaceHolder 2"/>
           <p:cNvSpPr>
             <a:spLocks noGrp="1"/>
           </p:cNvSpPr>
@@ -1095,8 +1095,8 @@
         </p:nvSpPr>
         <p:spPr>
           <a:xfrm>
-            <a:off x="504000" y="1326600"/>
-            <a:ext cx="9071640" cy="3288240"/>
+            <a:off x="503640" y="1326240"/>
+            <a:ext cx="9069120" cy="3287520"/>
           </a:xfrm>
           <a:prstGeom prst="rect">
             <a:avLst/>
@@ -1151,7 +1151,7 @@
         <p:txBody>
           <a:bodyPr/>
           <a:p>
-            <a:fld id="{FB811987-217F-4C39-8D0A-B53F498E9ABF}" type="slidenum">
+            <a:fld id="{9ED23F3B-2047-450B-B05F-CF8DFEC005D5}" type="slidenum">
               <a:t>&lt;#&gt;</a:t>
             </a:fld>
           </a:p>
@@ -1202,7 +1202,7 @@
       </p:grpSpPr>
       <p:sp>
         <p:nvSpPr>
-          <p:cNvPr id="12" name="PlaceHolder 1"/>
+          <p:cNvPr id="9" name="PlaceHolder 1"/>
           <p:cNvSpPr>
             <a:spLocks noGrp="1"/>
           </p:cNvSpPr>
@@ -1212,8 +1212,8 @@
         </p:nvSpPr>
         <p:spPr>
           <a:xfrm>
-            <a:off x="540000" y="180000"/>
-            <a:ext cx="8279280" cy="629280"/>
+            <a:off x="503640" y="225720"/>
+            <a:ext cx="9066240" cy="944280"/>
           </a:xfrm>
           <a:prstGeom prst="rect">
             <a:avLst/>
@@ -1239,7 +1239,7 @@
       </p:sp>
       <p:sp>
         <p:nvSpPr>
-          <p:cNvPr id="13" name="PlaceHolder 2"/>
+          <p:cNvPr id="10" name="PlaceHolder 2"/>
           <p:cNvSpPr>
             <a:spLocks noGrp="1"/>
           </p:cNvSpPr>
@@ -1249,8 +1249,8 @@
         </p:nvSpPr>
         <p:spPr>
           <a:xfrm>
-            <a:off x="504000" y="1326600"/>
-            <a:ext cx="4426920" cy="3288240"/>
+            <a:off x="503640" y="1326240"/>
+            <a:ext cx="4425480" cy="3287520"/>
           </a:xfrm>
           <a:prstGeom prst="rect">
             <a:avLst/>
@@ -1273,7 +1273,7 @@
       </p:sp>
       <p:sp>
         <p:nvSpPr>
-          <p:cNvPr id="14" name="PlaceHolder 3"/>
+          <p:cNvPr id="11" name="PlaceHolder 3"/>
           <p:cNvSpPr>
             <a:spLocks noGrp="1"/>
           </p:cNvSpPr>
@@ -1283,8 +1283,8 @@
         </p:nvSpPr>
         <p:spPr>
           <a:xfrm>
-            <a:off x="5152680" y="1326600"/>
-            <a:ext cx="4426920" cy="3288240"/>
+            <a:off x="5150880" y="1326240"/>
+            <a:ext cx="4425480" cy="3287520"/>
           </a:xfrm>
           <a:prstGeom prst="rect">
             <a:avLst/>
@@ -1339,7 +1339,7 @@
         <p:txBody>
           <a:bodyPr/>
           <a:p>
-            <a:fld id="{7199B430-2D04-4F40-878B-D7EC776C8388}" type="slidenum">
+            <a:fld id="{1AF330A8-2B73-47B2-9C32-F5514C458C00}" type="slidenum">
               <a:t>&lt;#&gt;</a:t>
             </a:fld>
           </a:p>
@@ -1390,7 +1390,7 @@
       </p:grpSpPr>
       <p:sp>
         <p:nvSpPr>
-          <p:cNvPr id="15" name="PlaceHolder 1"/>
+          <p:cNvPr id="12" name="PlaceHolder 1"/>
           <p:cNvSpPr>
             <a:spLocks noGrp="1"/>
           </p:cNvSpPr>
@@ -1400,8 +1400,8 @@
         </p:nvSpPr>
         <p:spPr>
           <a:xfrm>
-            <a:off x="540000" y="180000"/>
-            <a:ext cx="8279280" cy="629280"/>
+            <a:off x="503640" y="225720"/>
+            <a:ext cx="9066240" cy="944280"/>
           </a:xfrm>
           <a:prstGeom prst="rect">
             <a:avLst/>
@@ -1459,7 +1459,7 @@
         <p:txBody>
           <a:bodyPr/>
           <a:p>
-            <a:fld id="{04859EE8-79EF-43D5-9772-6F928D89408B}" type="slidenum">
+            <a:fld id="{CACB3A11-0886-4396-B1FC-380982C934E2}" type="slidenum">
               <a:t>&lt;#&gt;</a:t>
             </a:fld>
           </a:p>
@@ -1510,7 +1510,7 @@
       </p:grpSpPr>
       <p:sp>
         <p:nvSpPr>
-          <p:cNvPr id="16" name="PlaceHolder 1"/>
+          <p:cNvPr id="13" name="PlaceHolder 1"/>
           <p:cNvSpPr>
             <a:spLocks noGrp="1"/>
           </p:cNvSpPr>
@@ -1520,8 +1520,8 @@
         </p:nvSpPr>
         <p:spPr>
           <a:xfrm>
-            <a:off x="540000" y="180000"/>
-            <a:ext cx="8279280" cy="2918160"/>
+            <a:off x="503640" y="225720"/>
+            <a:ext cx="9066240" cy="4378320"/>
           </a:xfrm>
           <a:prstGeom prst="rect">
             <a:avLst/>
@@ -1579,7 +1579,7 @@
         <p:txBody>
           <a:bodyPr/>
           <a:p>
-            <a:fld id="{01D44F2F-F222-4B73-AB92-1E6D367C44E4}" type="slidenum">
+            <a:fld id="{52B934E8-2B34-484C-A1C1-43A4528BECA9}" type="slidenum">
               <a:t>&lt;#&gt;</a:t>
             </a:fld>
           </a:p>
@@ -1630,7 +1630,7 @@
       </p:grpSpPr>
       <p:sp>
         <p:nvSpPr>
-          <p:cNvPr id="17" name="PlaceHolder 1"/>
+          <p:cNvPr id="14" name="PlaceHolder 1"/>
           <p:cNvSpPr>
             <a:spLocks noGrp="1"/>
           </p:cNvSpPr>
@@ -1640,8 +1640,8 @@
         </p:nvSpPr>
         <p:spPr>
           <a:xfrm>
-            <a:off x="540000" y="180000"/>
-            <a:ext cx="8279280" cy="629280"/>
+            <a:off x="503640" y="225720"/>
+            <a:ext cx="9066240" cy="944280"/>
           </a:xfrm>
           <a:prstGeom prst="rect">
             <a:avLst/>
@@ -1667,7 +1667,7 @@
       </p:sp>
       <p:sp>
         <p:nvSpPr>
-          <p:cNvPr id="18" name="PlaceHolder 2"/>
+          <p:cNvPr id="15" name="PlaceHolder 2"/>
           <p:cNvSpPr>
             <a:spLocks noGrp="1"/>
           </p:cNvSpPr>
@@ -1677,8 +1677,8 @@
         </p:nvSpPr>
         <p:spPr>
           <a:xfrm>
-            <a:off x="504000" y="1326600"/>
-            <a:ext cx="4426920" cy="1568160"/>
+            <a:off x="503640" y="1326240"/>
+            <a:ext cx="4425480" cy="1567800"/>
           </a:xfrm>
           <a:prstGeom prst="rect">
             <a:avLst/>
@@ -1701,7 +1701,7 @@
       </p:sp>
       <p:sp>
         <p:nvSpPr>
-          <p:cNvPr id="19" name="PlaceHolder 3"/>
+          <p:cNvPr id="16" name="PlaceHolder 3"/>
           <p:cNvSpPr>
             <a:spLocks noGrp="1"/>
           </p:cNvSpPr>
@@ -1711,8 +1711,8 @@
         </p:nvSpPr>
         <p:spPr>
           <a:xfrm>
-            <a:off x="5152680" y="1326600"/>
-            <a:ext cx="4426920" cy="3288240"/>
+            <a:off x="5150880" y="1326240"/>
+            <a:ext cx="4425480" cy="3287520"/>
           </a:xfrm>
           <a:prstGeom prst="rect">
             <a:avLst/>
@@ -1735,7 +1735,7 @@
       </p:sp>
       <p:sp>
         <p:nvSpPr>
-          <p:cNvPr id="20" name="PlaceHolder 4"/>
+          <p:cNvPr id="17" name="PlaceHolder 4"/>
           <p:cNvSpPr>
             <a:spLocks noGrp="1"/>
           </p:cNvSpPr>
@@ -1745,8 +1745,8 @@
         </p:nvSpPr>
         <p:spPr>
           <a:xfrm>
-            <a:off x="504000" y="3044160"/>
-            <a:ext cx="4426920" cy="1568160"/>
+            <a:off x="503640" y="3043440"/>
+            <a:ext cx="4425480" cy="1567800"/>
           </a:xfrm>
           <a:prstGeom prst="rect">
             <a:avLst/>
@@ -1801,7 +1801,7 @@
         <p:txBody>
           <a:bodyPr/>
           <a:p>
-            <a:fld id="{061E5489-40CA-4F27-A6CB-FD474D2D09D0}" type="slidenum">
+            <a:fld id="{C2C02360-D7D8-4510-9A14-2FCA9820358F}" type="slidenum">
               <a:t>&lt;#&gt;</a:t>
             </a:fld>
           </a:p>
@@ -1852,7 +1852,7 @@
       </p:grpSpPr>
       <p:sp>
         <p:nvSpPr>
-          <p:cNvPr id="21" name="PlaceHolder 1"/>
+          <p:cNvPr id="18" name="PlaceHolder 1"/>
           <p:cNvSpPr>
             <a:spLocks noGrp="1"/>
           </p:cNvSpPr>
@@ -1862,8 +1862,8 @@
         </p:nvSpPr>
         <p:spPr>
           <a:xfrm>
-            <a:off x="540000" y="180000"/>
-            <a:ext cx="8279280" cy="629280"/>
+            <a:off x="503640" y="225720"/>
+            <a:ext cx="9066240" cy="944280"/>
           </a:xfrm>
           <a:prstGeom prst="rect">
             <a:avLst/>
@@ -1889,7 +1889,7 @@
       </p:sp>
       <p:sp>
         <p:nvSpPr>
-          <p:cNvPr id="22" name="PlaceHolder 2"/>
+          <p:cNvPr id="19" name="PlaceHolder 2"/>
           <p:cNvSpPr>
             <a:spLocks noGrp="1"/>
           </p:cNvSpPr>
@@ -1899,8 +1899,8 @@
         </p:nvSpPr>
         <p:spPr>
           <a:xfrm>
-            <a:off x="504000" y="1326600"/>
-            <a:ext cx="4426920" cy="3288240"/>
+            <a:off x="503640" y="1326240"/>
+            <a:ext cx="4425480" cy="3287520"/>
           </a:xfrm>
           <a:prstGeom prst="rect">
             <a:avLst/>
@@ -1923,7 +1923,7 @@
       </p:sp>
       <p:sp>
         <p:nvSpPr>
-          <p:cNvPr id="23" name="PlaceHolder 3"/>
+          <p:cNvPr id="20" name="PlaceHolder 3"/>
           <p:cNvSpPr>
             <a:spLocks noGrp="1"/>
           </p:cNvSpPr>
@@ -1933,8 +1933,8 @@
         </p:nvSpPr>
         <p:spPr>
           <a:xfrm>
-            <a:off x="5152680" y="1326600"/>
-            <a:ext cx="4426920" cy="1568160"/>
+            <a:off x="5150880" y="1326240"/>
+            <a:ext cx="4425480" cy="1567800"/>
           </a:xfrm>
           <a:prstGeom prst="rect">
             <a:avLst/>
@@ -1957,7 +1957,7 @@
       </p:sp>
       <p:sp>
         <p:nvSpPr>
-          <p:cNvPr id="24" name="PlaceHolder 4"/>
+          <p:cNvPr id="21" name="PlaceHolder 4"/>
           <p:cNvSpPr>
             <a:spLocks noGrp="1"/>
           </p:cNvSpPr>
@@ -1967,8 +1967,8 @@
         </p:nvSpPr>
         <p:spPr>
           <a:xfrm>
-            <a:off x="5152680" y="3044160"/>
-            <a:ext cx="4426920" cy="1568160"/>
+            <a:off x="5150880" y="3043440"/>
+            <a:ext cx="4425480" cy="1567800"/>
           </a:xfrm>
           <a:prstGeom prst="rect">
             <a:avLst/>
@@ -2023,7 +2023,7 @@
         <p:txBody>
           <a:bodyPr/>
           <a:p>
-            <a:fld id="{8A81453E-A9E1-4F63-8560-B7DA6BDC1DDE}" type="slidenum">
+            <a:fld id="{5BAD7330-F15B-4742-8B3C-9C8AE64E351C}" type="slidenum">
               <a:t>&lt;#&gt;</a:t>
             </a:fld>
           </a:p>
@@ -2074,7 +2074,7 @@
       </p:grpSpPr>
       <p:sp>
         <p:nvSpPr>
-          <p:cNvPr id="25" name="PlaceHolder 1"/>
+          <p:cNvPr id="22" name="PlaceHolder 1"/>
           <p:cNvSpPr>
             <a:spLocks noGrp="1"/>
           </p:cNvSpPr>
@@ -2084,8 +2084,8 @@
         </p:nvSpPr>
         <p:spPr>
           <a:xfrm>
-            <a:off x="540000" y="180000"/>
-            <a:ext cx="8279280" cy="629280"/>
+            <a:off x="503640" y="225720"/>
+            <a:ext cx="9066240" cy="944280"/>
           </a:xfrm>
           <a:prstGeom prst="rect">
             <a:avLst/>
@@ -2111,7 +2111,7 @@
       </p:sp>
       <p:sp>
         <p:nvSpPr>
-          <p:cNvPr id="26" name="PlaceHolder 2"/>
+          <p:cNvPr id="23" name="PlaceHolder 2"/>
           <p:cNvSpPr>
             <a:spLocks noGrp="1"/>
           </p:cNvSpPr>
@@ -2121,8 +2121,8 @@
         </p:nvSpPr>
         <p:spPr>
           <a:xfrm>
-            <a:off x="504000" y="1326600"/>
-            <a:ext cx="4426920" cy="1568160"/>
+            <a:off x="503640" y="1326240"/>
+            <a:ext cx="4425480" cy="1567800"/>
           </a:xfrm>
           <a:prstGeom prst="rect">
             <a:avLst/>
@@ -2145,7 +2145,7 @@
       </p:sp>
       <p:sp>
         <p:nvSpPr>
-          <p:cNvPr id="27" name="PlaceHolder 3"/>
+          <p:cNvPr id="24" name="PlaceHolder 3"/>
           <p:cNvSpPr>
             <a:spLocks noGrp="1"/>
           </p:cNvSpPr>
@@ -2155,8 +2155,8 @@
         </p:nvSpPr>
         <p:spPr>
           <a:xfrm>
-            <a:off x="5152680" y="1326600"/>
-            <a:ext cx="4426920" cy="1568160"/>
+            <a:off x="5150880" y="1326240"/>
+            <a:ext cx="4425480" cy="1567800"/>
           </a:xfrm>
           <a:prstGeom prst="rect">
             <a:avLst/>
@@ -2179,7 +2179,7 @@
       </p:sp>
       <p:sp>
         <p:nvSpPr>
-          <p:cNvPr id="28" name="PlaceHolder 4"/>
+          <p:cNvPr id="25" name="PlaceHolder 4"/>
           <p:cNvSpPr>
             <a:spLocks noGrp="1"/>
           </p:cNvSpPr>
@@ -2189,8 +2189,8 @@
         </p:nvSpPr>
         <p:spPr>
           <a:xfrm>
-            <a:off x="504000" y="3044160"/>
-            <a:ext cx="9071640" cy="1568160"/>
+            <a:off x="503640" y="3043440"/>
+            <a:ext cx="9069120" cy="1567800"/>
           </a:xfrm>
           <a:prstGeom prst="rect">
             <a:avLst/>
@@ -2245,7 +2245,7 @@
         <p:txBody>
           <a:bodyPr/>
           <a:p>
-            <a:fld id="{FDED9963-D755-4299-95D1-DDA004DE77E4}" type="slidenum">
+            <a:fld id="{53E84026-55CF-4ED3-946A-1FB71335A352}" type="slidenum">
               <a:t>&lt;#&gt;</a:t>
             </a:fld>
           </a:p>
@@ -2280,6 +2280,14 @@
 <file path=ppt/slideMasters/slideMaster1.xml><?xml version="1.0" encoding="utf-8"?>
 <p:sldMaster xmlns:a="http://schemas.openxmlformats.org/drawingml/2006/main" xmlns:p="http://schemas.openxmlformats.org/presentationml/2006/main" xmlns:r="http://schemas.openxmlformats.org/officeDocument/2006/relationships" xmlns:p14="http://schemas.microsoft.com/office/powerpoint/2010/main" xmlns:p15="http://schemas.microsoft.com/office/powerpoint/2012/main" xmlns:mc="http://schemas.openxmlformats.org/markup-compatibility/2006">
   <p:cSld>
+    <p:bg>
+      <p:bgPr>
+        <a:blipFill rotWithShape="0">
+          <a:blip r:embed="rId2"/>
+          <a:stretch/>
+        </a:blipFill>
+      </p:bgPr>
+    </p:bg>
     <p:spTree>
       <p:nvGrpSpPr>
         <p:cNvPr id="1" name=""/>
@@ -2296,79 +2304,7 @@
       </p:grpSpPr>
       <p:sp>
         <p:nvSpPr>
-          <p:cNvPr id="0" name=""/>
-          <p:cNvSpPr/>
-          <p:nvPr/>
-        </p:nvSpPr>
-        <p:spPr>
-          <a:xfrm>
-            <a:off x="0" y="-8640"/>
-            <a:ext cx="10079280" cy="906120"/>
-          </a:xfrm>
-          <a:prstGeom prst="rect">
-            <a:avLst/>
-          </a:prstGeom>
-          <a:noFill/>
-          <a:ln w="0">
-            <a:noFill/>
-          </a:ln>
-        </p:spPr>
-        <p:style>
-          <a:lnRef idx="0"/>
-          <a:fillRef idx="0"/>
-          <a:effectRef idx="0"/>
-          <a:fontRef idx="minor"/>
-        </p:style>
-      </p:sp>
-      <p:pic>
-        <p:nvPicPr>
-          <p:cNvPr id="1" name="" descr=""/>
-          <p:cNvPicPr/>
-          <p:nvPr/>
-        </p:nvPicPr>
-        <p:blipFill>
-          <a:blip r:embed="rId2"/>
-          <a:stretch/>
-        </p:blipFill>
-        <p:spPr>
-          <a:xfrm>
-            <a:off x="8820000" y="90000"/>
-            <a:ext cx="755280" cy="719280"/>
-          </a:xfrm>
-          <a:prstGeom prst="rect">
-            <a:avLst/>
-          </a:prstGeom>
-          <a:ln w="25200">
-            <a:noFill/>
-          </a:ln>
-        </p:spPr>
-      </p:pic>
-      <p:pic>
-        <p:nvPicPr>
-          <p:cNvPr id="2" name="" descr=""/>
-          <p:cNvPicPr/>
-          <p:nvPr/>
-        </p:nvPicPr>
-        <p:blipFill>
-          <a:blip r:embed="rId3"/>
-          <a:stretch/>
-        </p:blipFill>
-        <p:spPr>
-          <a:xfrm>
-            <a:off x="180000" y="5220000"/>
-            <a:ext cx="9719280" cy="179280"/>
-          </a:xfrm>
-          <a:prstGeom prst="rect">
-            <a:avLst/>
-          </a:prstGeom>
-          <a:ln w="25200">
-            <a:noFill/>
-          </a:ln>
-        </p:spPr>
-      </p:pic>
-      <p:sp>
-        <p:nvSpPr>
-          <p:cNvPr id="3" name="PlaceHolder 1"/>
+          <p:cNvPr id="0" name="PlaceHolder 1"/>
           <p:cNvSpPr>
             <a:spLocks noGrp="1"/>
           </p:cNvSpPr>
@@ -2378,8 +2314,8 @@
         </p:nvSpPr>
         <p:spPr>
           <a:xfrm>
-            <a:off x="540000" y="180000"/>
-            <a:ext cx="8279280" cy="629280"/>
+            <a:off x="503640" y="225720"/>
+            <a:ext cx="9066240" cy="944280"/>
           </a:xfrm>
           <a:prstGeom prst="rect">
             <a:avLst/>
@@ -2408,7 +2344,168 @@
       </p:sp>
       <p:sp>
         <p:nvSpPr>
-          <p:cNvPr id="4" name="PlaceHolder 2"/>
+          <p:cNvPr id="1" name="PlaceHolder 2"/>
+          <p:cNvSpPr>
+            <a:spLocks noGrp="1"/>
+          </p:cNvSpPr>
+          <p:nvPr>
+            <p:ph type="ftr" idx="1"/>
+          </p:nvPr>
+        </p:nvSpPr>
+        <p:spPr>
+          <a:xfrm>
+            <a:off x="3445920" y="5163840"/>
+            <a:ext cx="3192120" cy="388800"/>
+          </a:xfrm>
+          <a:prstGeom prst="rect">
+            <a:avLst/>
+          </a:prstGeom>
+          <a:noFill/>
+          <a:ln w="0">
+            <a:noFill/>
+          </a:ln>
+        </p:spPr>
+        <p:txBody>
+          <a:bodyPr lIns="0" rIns="0" tIns="0" bIns="0" anchor="t">
+            <a:noAutofit/>
+          </a:bodyPr>
+          <a:lstStyle>
+            <a:lvl1pPr algn="ctr">
+              <a:lnSpc>
+                <a:spcPct val="100000"/>
+              </a:lnSpc>
+              <a:buNone/>
+              <a:defRPr b="0" lang="en-US" sz="1400" spc="-1" strike="noStrike">
+                <a:latin typeface="Times New Roman"/>
+              </a:defRPr>
+            </a:lvl1pPr>
+          </a:lstStyle>
+          <a:p>
+            <a:pPr algn="ctr">
+              <a:lnSpc>
+                <a:spcPct val="100000"/>
+              </a:lnSpc>
+              <a:buNone/>
+            </a:pPr>
+            <a:r>
+              <a:rPr b="0" lang="en-US" sz="1400" spc="-1" strike="noStrike">
+                <a:latin typeface="Times New Roman"/>
+              </a:rPr>
+              <a:t>&lt;footer&gt;</a:t>
+            </a:r>
+            <a:endParaRPr b="0" lang="en-US" sz="1400" spc="-1" strike="noStrike">
+              <a:latin typeface="Times New Roman"/>
+            </a:endParaRPr>
+          </a:p>
+        </p:txBody>
+      </p:sp>
+      <p:sp>
+        <p:nvSpPr>
+          <p:cNvPr id="2" name="PlaceHolder 3"/>
+          <p:cNvSpPr>
+            <a:spLocks noGrp="1"/>
+          </p:cNvSpPr>
+          <p:nvPr>
+            <p:ph type="sldNum" idx="2"/>
+          </p:nvPr>
+        </p:nvSpPr>
+        <p:spPr>
+          <a:xfrm>
+            <a:off x="7224480" y="5163840"/>
+            <a:ext cx="2345400" cy="388800"/>
+          </a:xfrm>
+          <a:prstGeom prst="rect">
+            <a:avLst/>
+          </a:prstGeom>
+          <a:noFill/>
+          <a:ln w="0">
+            <a:noFill/>
+          </a:ln>
+        </p:spPr>
+        <p:txBody>
+          <a:bodyPr lIns="0" rIns="0" tIns="0" bIns="0" anchor="t">
+            <a:noAutofit/>
+          </a:bodyPr>
+          <a:lstStyle>
+            <a:lvl1pPr algn="r">
+              <a:lnSpc>
+                <a:spcPct val="100000"/>
+              </a:lnSpc>
+              <a:buNone/>
+              <a:defRPr b="0" lang="en-US" sz="1400" spc="-1" strike="noStrike">
+                <a:latin typeface="Times New Roman"/>
+              </a:defRPr>
+            </a:lvl1pPr>
+          </a:lstStyle>
+          <a:p>
+            <a:pPr algn="r">
+              <a:lnSpc>
+                <a:spcPct val="100000"/>
+              </a:lnSpc>
+              <a:buNone/>
+            </a:pPr>
+            <a:fld id="{92F16C21-F647-4678-A50B-3CF1B3569100}" type="slidenum">
+              <a:rPr b="0" lang="en-US" sz="1400" spc="-1" strike="noStrike">
+                <a:latin typeface="Times New Roman"/>
+              </a:rPr>
+              <a:t>&lt;number&gt;</a:t>
+            </a:fld>
+            <a:endParaRPr b="0" lang="en-US" sz="1400" spc="-1" strike="noStrike">
+              <a:latin typeface="Times New Roman"/>
+            </a:endParaRPr>
+          </a:p>
+        </p:txBody>
+      </p:sp>
+      <p:sp>
+        <p:nvSpPr>
+          <p:cNvPr id="3" name="PlaceHolder 4"/>
+          <p:cNvSpPr>
+            <a:spLocks noGrp="1"/>
+          </p:cNvSpPr>
+          <p:nvPr>
+            <p:ph type="dt" idx="3"/>
+          </p:nvPr>
+        </p:nvSpPr>
+        <p:spPr>
+          <a:xfrm>
+            <a:off x="503640" y="5163840"/>
+            <a:ext cx="2345400" cy="388800"/>
+          </a:xfrm>
+          <a:prstGeom prst="rect">
+            <a:avLst/>
+          </a:prstGeom>
+          <a:noFill/>
+          <a:ln w="0">
+            <a:noFill/>
+          </a:ln>
+        </p:spPr>
+        <p:txBody>
+          <a:bodyPr lIns="0" rIns="0" tIns="0" bIns="0" anchor="t">
+            <a:noAutofit/>
+          </a:bodyPr>
+          <a:lstStyle>
+            <a:lvl1pPr>
+              <a:defRPr b="0" lang="en-US" sz="1400" spc="-1" strike="noStrike">
+                <a:latin typeface="Times New Roman"/>
+              </a:defRPr>
+            </a:lvl1pPr>
+          </a:lstStyle>
+          <a:p>
+            <a:r>
+              <a:rPr b="0" lang="en-US" sz="1400" spc="-1" strike="noStrike">
+                <a:latin typeface="Times New Roman"/>
+              </a:rPr>
+              <a:t>&lt;date/time&gt;</a:t>
+            </a:r>
+            <a:endParaRPr b="0" lang="en-US" sz="1400" spc="-1" strike="noStrike">
+              <a:latin typeface="Times New Roman"/>
+            </a:endParaRPr>
+          </a:p>
+        </p:txBody>
+      </p:sp>
+      <p:sp>
+        <p:nvSpPr>
+          <p:cNvPr id="4" name="PlaceHolder 5"/>
           <p:cNvSpPr>
             <a:spLocks noGrp="1"/>
           </p:cNvSpPr>
@@ -2418,8 +2515,8 @@
         </p:nvSpPr>
         <p:spPr>
           <a:xfrm>
-            <a:off x="504000" y="1326600"/>
-            <a:ext cx="9071640" cy="3288240"/>
+            <a:off x="503640" y="1326240"/>
+            <a:ext cx="9069120" cy="3287520"/>
           </a:xfrm>
           <a:prstGeom prst="rect">
             <a:avLst/>
@@ -2446,12 +2543,12 @@
               <a:buChar char=""/>
             </a:pPr>
             <a:r>
-              <a:rPr b="0" lang="en-US" sz="1800" spc="-1" strike="noStrike">
+              <a:rPr b="0" lang="en-US" sz="3200" spc="-1" strike="noStrike">
                 <a:latin typeface="Arial"/>
               </a:rPr>
               <a:t>Click to edit the outline text format</a:t>
             </a:r>
-            <a:endParaRPr b="0" lang="en-US" sz="1800" spc="-1" strike="noStrike">
+            <a:endParaRPr b="0" lang="en-US" sz="3200" spc="-1" strike="noStrike">
               <a:latin typeface="Arial"/>
             </a:endParaRPr>
           </a:p>
@@ -2468,12 +2565,12 @@
               <a:buChar char=""/>
             </a:pPr>
             <a:r>
-              <a:rPr b="0" lang="en-US" sz="1800" spc="-1" strike="noStrike">
+              <a:rPr b="0" lang="en-US" sz="2800" spc="-1" strike="noStrike">
                 <a:latin typeface="Arial"/>
               </a:rPr>
               <a:t>Second Outline Level</a:t>
             </a:r>
-            <a:endParaRPr b="0" lang="en-US" sz="1800" spc="-1" strike="noStrike">
+            <a:endParaRPr b="0" lang="en-US" sz="2800" spc="-1" strike="noStrike">
               <a:latin typeface="Arial"/>
             </a:endParaRPr>
           </a:p>
@@ -2490,12 +2587,12 @@
               <a:buChar char=""/>
             </a:pPr>
             <a:r>
-              <a:rPr b="0" lang="en-US" sz="1800" spc="-1" strike="noStrike">
+              <a:rPr b="0" lang="en-US" sz="2400" spc="-1" strike="noStrike">
                 <a:latin typeface="Arial"/>
               </a:rPr>
               <a:t>Third Outline Level</a:t>
             </a:r>
-            <a:endParaRPr b="0" lang="en-US" sz="1800" spc="-1" strike="noStrike">
+            <a:endParaRPr b="0" lang="en-US" sz="2400" spc="-1" strike="noStrike">
               <a:latin typeface="Arial"/>
             </a:endParaRPr>
           </a:p>
@@ -2512,12 +2609,12 @@
               <a:buChar char=""/>
             </a:pPr>
             <a:r>
-              <a:rPr b="0" lang="en-US" sz="1800" spc="-1" strike="noStrike">
+              <a:rPr b="0" lang="en-US" sz="2000" spc="-1" strike="noStrike">
                 <a:latin typeface="Arial"/>
               </a:rPr>
               <a:t>Fourth Outline Level</a:t>
             </a:r>
-            <a:endParaRPr b="0" lang="en-US" sz="1800" spc="-1" strike="noStrike">
+            <a:endParaRPr b="0" lang="en-US" sz="2000" spc="-1" strike="noStrike">
               <a:latin typeface="Arial"/>
             </a:endParaRPr>
           </a:p>
@@ -2534,12 +2631,12 @@
               <a:buChar char=""/>
             </a:pPr>
             <a:r>
-              <a:rPr b="0" lang="en-US" sz="1800" spc="-1" strike="noStrike">
+              <a:rPr b="0" lang="en-US" sz="2000" spc="-1" strike="noStrike">
                 <a:latin typeface="Arial"/>
               </a:rPr>
               <a:t>Fifth Outline Level</a:t>
             </a:r>
-            <a:endParaRPr b="0" lang="en-US" sz="1800" spc="-1" strike="noStrike">
+            <a:endParaRPr b="0" lang="en-US" sz="2000" spc="-1" strike="noStrike">
               <a:latin typeface="Arial"/>
             </a:endParaRPr>
           </a:p>
@@ -2556,12 +2653,12 @@
               <a:buChar char=""/>
             </a:pPr>
             <a:r>
-              <a:rPr b="0" lang="en-US" sz="1800" spc="-1" strike="noStrike">
+              <a:rPr b="0" lang="en-US" sz="2000" spc="-1" strike="noStrike">
                 <a:latin typeface="Arial"/>
               </a:rPr>
               <a:t>Sixth Outline Level</a:t>
             </a:r>
-            <a:endParaRPr b="0" lang="en-US" sz="1800" spc="-1" strike="noStrike">
+            <a:endParaRPr b="0" lang="en-US" sz="2000" spc="-1" strike="noStrike">
               <a:latin typeface="Arial"/>
             </a:endParaRPr>
           </a:p>
@@ -2578,174 +2675,13 @@
               <a:buChar char=""/>
             </a:pPr>
             <a:r>
-              <a:rPr b="0" lang="en-US" sz="1800" spc="-1" strike="noStrike">
+              <a:rPr b="0" lang="en-US" sz="2000" spc="-1" strike="noStrike">
                 <a:latin typeface="Arial"/>
               </a:rPr>
               <a:t>Seventh Outline Level</a:t>
             </a:r>
-            <a:endParaRPr b="0" lang="en-US" sz="1800" spc="-1" strike="noStrike">
-              <a:latin typeface="Arial"/>
-            </a:endParaRPr>
-          </a:p>
-        </p:txBody>
-      </p:sp>
-      <p:sp>
-        <p:nvSpPr>
-          <p:cNvPr id="5" name="PlaceHolder 3"/>
-          <p:cNvSpPr>
-            <a:spLocks noGrp="1"/>
-          </p:cNvSpPr>
-          <p:nvPr>
-            <p:ph type="ftr" idx="1"/>
-          </p:nvPr>
-        </p:nvSpPr>
-        <p:spPr>
-          <a:xfrm>
-            <a:off x="3420000" y="5400000"/>
-            <a:ext cx="3239280" cy="269280"/>
-          </a:xfrm>
-          <a:prstGeom prst="rect">
-            <a:avLst/>
-          </a:prstGeom>
-          <a:noFill/>
-          <a:ln w="0">
-            <a:noFill/>
-          </a:ln>
-        </p:spPr>
-        <p:txBody>
-          <a:bodyPr lIns="0" rIns="0" tIns="0" bIns="0" anchor="t">
-            <a:noAutofit/>
-          </a:bodyPr>
-          <a:lstStyle>
-            <a:lvl1pPr algn="ctr">
-              <a:lnSpc>
-                <a:spcPct val="100000"/>
-              </a:lnSpc>
-              <a:buNone/>
-              <a:defRPr b="0" lang="en-US" sz="1400" spc="-1" strike="noStrike">
-                <a:latin typeface="Arial"/>
-              </a:defRPr>
-            </a:lvl1pPr>
-          </a:lstStyle>
-          <a:p>
-            <a:pPr algn="ctr">
-              <a:lnSpc>
-                <a:spcPct val="100000"/>
-              </a:lnSpc>
-              <a:buNone/>
-            </a:pPr>
-            <a:r>
-              <a:rPr b="0" lang="en-US" sz="1400" spc="-1" strike="noStrike">
-                <a:latin typeface="Arial"/>
-              </a:rPr>
-              <a:t>&lt;footer&gt;</a:t>
-            </a:r>
-            <a:endParaRPr b="0" lang="en-US" sz="1400" spc="-1" strike="noStrike">
-              <a:latin typeface="Times New Roman"/>
-            </a:endParaRPr>
-          </a:p>
-        </p:txBody>
-      </p:sp>
-      <p:sp>
-        <p:nvSpPr>
-          <p:cNvPr id="6" name="PlaceHolder 4"/>
-          <p:cNvSpPr>
-            <a:spLocks noGrp="1"/>
-          </p:cNvSpPr>
-          <p:nvPr>
-            <p:ph type="sldNum" idx="2"/>
-          </p:nvPr>
-        </p:nvSpPr>
-        <p:spPr>
-          <a:xfrm>
-            <a:off x="7200000" y="5400000"/>
-            <a:ext cx="2339280" cy="269280"/>
-          </a:xfrm>
-          <a:prstGeom prst="rect">
-            <a:avLst/>
-          </a:prstGeom>
-          <a:noFill/>
-          <a:ln w="0">
-            <a:noFill/>
-          </a:ln>
-        </p:spPr>
-        <p:txBody>
-          <a:bodyPr lIns="0" rIns="0" tIns="0" bIns="0" anchor="t">
-            <a:noAutofit/>
-          </a:bodyPr>
-          <a:lstStyle>
-            <a:lvl1pPr algn="r">
-              <a:lnSpc>
-                <a:spcPct val="100000"/>
-              </a:lnSpc>
-              <a:buNone/>
-              <a:defRPr b="0" lang="en-US" sz="1400" spc="-1" strike="noStrike">
-                <a:latin typeface="Arial"/>
-              </a:defRPr>
-            </a:lvl1pPr>
-          </a:lstStyle>
-          <a:p>
-            <a:pPr algn="r">
-              <a:lnSpc>
-                <a:spcPct val="100000"/>
-              </a:lnSpc>
-              <a:buNone/>
-            </a:pPr>
-            <a:fld id="{1356E95B-2ACF-4356-88FB-6149FDC8CD61}" type="slidenum">
-              <a:rPr b="0" lang="en-US" sz="1400" spc="-1" strike="noStrike">
-                <a:latin typeface="Arial"/>
-              </a:rPr>
-              <a:t>&lt;number&gt;</a:t>
-            </a:fld>
-            <a:endParaRPr b="0" lang="en-US" sz="1400" spc="-1" strike="noStrike">
-              <a:latin typeface="Times New Roman"/>
-            </a:endParaRPr>
-          </a:p>
-        </p:txBody>
-      </p:sp>
-      <p:sp>
-        <p:nvSpPr>
-          <p:cNvPr id="7" name="PlaceHolder 5"/>
-          <p:cNvSpPr>
-            <a:spLocks noGrp="1"/>
-          </p:cNvSpPr>
-          <p:nvPr>
-            <p:ph type="dt" idx="3"/>
-          </p:nvPr>
-        </p:nvSpPr>
-        <p:spPr>
-          <a:xfrm>
-            <a:off x="540000" y="5400000"/>
-            <a:ext cx="2339280" cy="269280"/>
-          </a:xfrm>
-          <a:prstGeom prst="rect">
-            <a:avLst/>
-          </a:prstGeom>
-          <a:noFill/>
-          <a:ln w="0">
-            <a:noFill/>
-          </a:ln>
-        </p:spPr>
-        <p:txBody>
-          <a:bodyPr lIns="0" rIns="0" tIns="0" bIns="0" anchor="t">
-            <a:noAutofit/>
-          </a:bodyPr>
-          <a:lstStyle>
-            <a:lvl1pPr>
-              <a:defRPr b="0" lang="en-US" sz="1400" spc="-1" strike="noStrike">
-                <a:latin typeface="Times New Roman"/>
-              </a:defRPr>
-            </a:lvl1pPr>
-          </a:lstStyle>
-          <a:p>
-            <a:r>
-              <a:rPr b="0" lang="en-US" sz="1400" spc="-1" strike="noStrike">
-                <a:latin typeface="Times New Roman"/>
-              </a:rPr>
-              <a:t>&lt;date/time&gt;</a:t>
-            </a:r>
-            <a:endParaRPr b="0" lang="en-US" sz="1400" spc="-1" strike="noStrike">
-              <a:latin typeface="Times New Roman"/>
+            <a:endParaRPr b="0" lang="en-US" sz="2000" spc="-1" strike="noStrike">
+              <a:latin typeface="Arial"/>
             </a:endParaRPr>
           </a:p>
         </p:txBody>
@@ -2754,18 +2690,18 @@
   </p:cSld>
   <p:clrMap bg1="lt1" bg2="lt2" tx1="dk1" tx2="dk2" accent1="accent1" accent2="accent2" accent3="accent3" accent4="accent4" accent5="accent5" accent6="accent6" hlink="hlink" folHlink="folHlink"/>
   <p:sldLayoutIdLst>
-    <p:sldLayoutId id="2147483649" r:id="rId4"/>
-    <p:sldLayoutId id="2147483650" r:id="rId5"/>
-    <p:sldLayoutId id="2147483651" r:id="rId6"/>
-    <p:sldLayoutId id="2147483652" r:id="rId7"/>
-    <p:sldLayoutId id="2147483653" r:id="rId8"/>
-    <p:sldLayoutId id="2147483654" r:id="rId9"/>
-    <p:sldLayoutId id="2147483655" r:id="rId10"/>
-    <p:sldLayoutId id="2147483656" r:id="rId11"/>
-    <p:sldLayoutId id="2147483657" r:id="rId12"/>
-    <p:sldLayoutId id="2147483658" r:id="rId13"/>
-    <p:sldLayoutId id="2147483659" r:id="rId14"/>
-    <p:sldLayoutId id="2147483660" r:id="rId15"/>
+    <p:sldLayoutId id="2147483649" r:id="rId3"/>
+    <p:sldLayoutId id="2147483650" r:id="rId4"/>
+    <p:sldLayoutId id="2147483651" r:id="rId5"/>
+    <p:sldLayoutId id="2147483652" r:id="rId6"/>
+    <p:sldLayoutId id="2147483653" r:id="rId7"/>
+    <p:sldLayoutId id="2147483654" r:id="rId8"/>
+    <p:sldLayoutId id="2147483655" r:id="rId9"/>
+    <p:sldLayoutId id="2147483656" r:id="rId10"/>
+    <p:sldLayoutId id="2147483657" r:id="rId11"/>
+    <p:sldLayoutId id="2147483658" r:id="rId12"/>
+    <p:sldLayoutId id="2147483659" r:id="rId13"/>
+    <p:sldLayoutId id="2147483660" r:id="rId14"/>
   </p:sldLayoutIdLst>
 </p:sldMaster>
 </file>
@@ -2789,53 +2725,7 @@
       </p:grpSpPr>
       <p:sp>
         <p:nvSpPr>
-          <p:cNvPr id="44" name=""/>
-          <p:cNvSpPr/>
-          <p:nvPr/>
-        </p:nvSpPr>
-        <p:spPr>
-          <a:xfrm>
-            <a:off x="540000" y="1260000"/>
-            <a:ext cx="8999280" cy="3959280"/>
-          </a:xfrm>
-          <a:prstGeom prst="rect">
-            <a:avLst/>
-          </a:prstGeom>
-          <a:noFill/>
-          <a:ln w="0">
-            <a:noFill/>
-          </a:ln>
-        </p:spPr>
-        <p:style>
-          <a:lnRef idx="0"/>
-          <a:fillRef idx="0"/>
-          <a:effectRef idx="0"/>
-          <a:fontRef idx="minor"/>
-        </p:style>
-      </p:sp>
-      <p:sp>
-        <p:nvSpPr>
-          <p:cNvPr id="2" name="PlaceHolder 1"/>
-          <p:cNvSpPr>
-            <a:spLocks noGrp="1"/>
-          </p:cNvSpPr>
-          <p:nvPr>
-            <p:ph idx="2" type="sldNum"/>
-          </p:nvPr>
-        </p:nvSpPr>
-        <p:spPr/>
-        <p:txBody>
-          <a:bodyPr/>
-          <a:p>
-            <a:fld id="{E929433E-D9D0-4402-AC2F-718B8E56A960}" type="slidenum">
-              <a:t>1</a:t>
-            </a:fld>
-          </a:p>
-        </p:txBody>
-      </p:sp>
-      <p:sp>
-        <p:nvSpPr>
-          <p:cNvPr name="TextBox 3" id="3"/>
+          <p:cNvPr name="TextBox 2" id="2"/>
           <p:cNvSpPr txBox="true"/>
           <p:nvPr>
             <p:ph type="title"/>
@@ -2867,7 +2757,7 @@
       </p:sp>
       <p:sp>
         <p:nvSpPr>
-          <p:cNvPr name="TextBox 4" id="4"/>
+          <p:cNvPr name="TextBox 3" id="3"/>
           <p:cNvSpPr txBox="true"/>
           <p:nvPr>
             <p:ph type="subTitle"/>
@@ -2954,7 +2844,7 @@
       </p:grpSpPr>
       <p:sp xmlns:r="http://schemas.openxmlformats.org/officeDocument/2006/relationships" xmlns:p14="http://schemas.microsoft.com/office/powerpoint/2010/main" xmlns:p15="http://schemas.microsoft.com/office/powerpoint/2012/main" xmlns:mc="http://schemas.openxmlformats.org/markup-compatibility/2006">
         <p:nvSpPr>
-          <p:cNvPr id="10" name="PlaceHolder 1"/>
+          <p:cNvPr id="7" name="PlaceHolder 1"/>
           <p:cNvSpPr>
             <a:spLocks noGrp="1"/>
           </p:cNvSpPr>
@@ -2964,8 +2854,8 @@
         </p:nvSpPr>
         <p:spPr>
           <a:xfrm>
-            <a:off x="540000" y="180000"/>
-            <a:ext cx="8279280" cy="629280"/>
+            <a:off x="503640" y="225720"/>
+            <a:ext cx="9066240" cy="944280"/>
           </a:xfrm>
           <a:prstGeom prst="rect">
             <a:avLst/>
@@ -2993,29 +2883,9 @@
           </a:p>
         </p:txBody>
       </p:sp>
-      <p:sp xmlns:p14="http://schemas.microsoft.com/office/powerpoint/2010/main" xmlns:r="http://schemas.openxmlformats.org/officeDocument/2006/relationships" xmlns:p15="http://schemas.microsoft.com/office/powerpoint/2012/main" xmlns:mc="http://schemas.openxmlformats.org/markup-compatibility/2006">
-        <p:nvSpPr>
-          <p:cNvPr id="2" name="PlaceHolder 1"/>
-          <p:cNvSpPr>
-            <a:spLocks noGrp="1"/>
-          </p:cNvSpPr>
-          <p:nvPr>
-            <p:ph idx="2" type="sldNum"/>
-          </p:nvPr>
-        </p:nvSpPr>
-        <p:spPr/>
-        <p:txBody>
-          <a:bodyPr/>
-          <a:p>
-            <a:fld id="{E929433E-D9D0-4402-AC2F-718B8E56A960}" type="slidenum">
-              <a:t>1</a:t>
-            </a:fld>
-          </a:p>
-        </p:txBody>
-      </p:sp>
-      <p:sp>
-        <p:nvSpPr>
-          <p:cNvPr name="TextBox 3" id="3"/>
+      <p:sp>
+        <p:nvSpPr>
+          <p:cNvPr name="TextBox 2" id="2"/>
           <p:cNvSpPr txBox="true"/>
           <p:nvPr>
             <p:ph type="obj"/>
@@ -3082,6 +2952,38 @@
               <a:rPr lang="en-US"/>
               <a:t>gradle init</a:t>
             </a:r>
+          </a:p>
+        </p:txBody>
+      </p:sp>
+      <p:sp>
+        <p:nvSpPr>
+          <p:cNvPr name="TextBox 3" id="3"/>
+          <p:cNvSpPr txBox="true"/>
+          <p:nvPr>
+            <p:ph type="ftr"/>
+          </p:nvPr>
+        </p:nvSpPr>
+        <p:spPr>
+          <a:xfrm>
+            <a:off x="5080000" y="5080000"/>
+            <a:ext cx="3810000" cy="508000"/>
+          </a:xfrm>
+          <a:prstGeom prst="rect">
+            <a:avLst/>
+          </a:prstGeom>
+        </p:spPr>
+        <p:txBody>
+          <a:bodyPr anchor="t" rtlCol="false"/>
+          <a:lstStyle/>
+          <a:p>
+            <a:pPr algn="l">
+              <a:defRPr/>
+            </a:pPr>
+            <a:r>
+              <a:rPr lang="en-US"/>
+              <a:t>2024-04-25         JacekKowalczyk82.org               1</a:t>
+            </a:r>
+            <a:endParaRPr lang="en-US"/>
           </a:p>
         </p:txBody>
       </p:sp>
@@ -3112,7 +3014,7 @@
       </p:grpSpPr>
       <p:sp xmlns:r="http://schemas.openxmlformats.org/officeDocument/2006/relationships" xmlns:p14="http://schemas.microsoft.com/office/powerpoint/2010/main" xmlns:p15="http://schemas.microsoft.com/office/powerpoint/2012/main" xmlns:mc="http://schemas.openxmlformats.org/markup-compatibility/2006">
         <p:nvSpPr>
-          <p:cNvPr id="10" name="PlaceHolder 1"/>
+          <p:cNvPr id="7" name="PlaceHolder 1"/>
           <p:cNvSpPr>
             <a:spLocks noGrp="1"/>
           </p:cNvSpPr>
@@ -3122,8 +3024,8 @@
         </p:nvSpPr>
         <p:spPr>
           <a:xfrm>
-            <a:off x="540000" y="180000"/>
-            <a:ext cx="8279280" cy="629280"/>
+            <a:off x="503640" y="225720"/>
+            <a:ext cx="9066240" cy="944280"/>
           </a:xfrm>
           <a:prstGeom prst="rect">
             <a:avLst/>
@@ -3151,29 +3053,9 @@
           </a:p>
         </p:txBody>
       </p:sp>
-      <p:sp xmlns:p14="http://schemas.microsoft.com/office/powerpoint/2010/main" xmlns:r="http://schemas.openxmlformats.org/officeDocument/2006/relationships" xmlns:p15="http://schemas.microsoft.com/office/powerpoint/2012/main" xmlns:mc="http://schemas.openxmlformats.org/markup-compatibility/2006">
-        <p:nvSpPr>
-          <p:cNvPr id="2" name="PlaceHolder 1"/>
-          <p:cNvSpPr>
-            <a:spLocks noGrp="1"/>
-          </p:cNvSpPr>
-          <p:nvPr>
-            <p:ph idx="2" type="sldNum"/>
-          </p:nvPr>
-        </p:nvSpPr>
-        <p:spPr/>
-        <p:txBody>
-          <a:bodyPr/>
-          <a:p>
-            <a:fld id="{E929433E-D9D0-4402-AC2F-718B8E56A960}" type="slidenum">
-              <a:t>1</a:t>
-            </a:fld>
-          </a:p>
-        </p:txBody>
-      </p:sp>
-      <p:sp>
-        <p:nvSpPr>
-          <p:cNvPr name="TextBox 3" id="3"/>
+      <p:sp>
+        <p:nvSpPr>
+          <p:cNvPr name="TextBox 2" id="2"/>
           <p:cNvSpPr txBox="true"/>
           <p:nvPr>
             <p:ph type="obj"/>
@@ -3220,6 +3102,38 @@
               <a:rPr lang="en-US"/>
               <a:t>https://github.com/eugenp/tutorials/blob/master/apache-poi-2/src/main/java/com/baeldung/poi/powerpoint/PowerPointHelper.java</a:t>
             </a:r>
+          </a:p>
+        </p:txBody>
+      </p:sp>
+      <p:sp>
+        <p:nvSpPr>
+          <p:cNvPr name="TextBox 3" id="3"/>
+          <p:cNvSpPr txBox="true"/>
+          <p:nvPr>
+            <p:ph type="ftr"/>
+          </p:nvPr>
+        </p:nvSpPr>
+        <p:spPr>
+          <a:xfrm>
+            <a:off x="5080000" y="5080000"/>
+            <a:ext cx="3810000" cy="508000"/>
+          </a:xfrm>
+          <a:prstGeom prst="rect">
+            <a:avLst/>
+          </a:prstGeom>
+        </p:spPr>
+        <p:txBody>
+          <a:bodyPr anchor="t" rtlCol="false"/>
+          <a:lstStyle/>
+          <a:p>
+            <a:pPr algn="l">
+              <a:defRPr/>
+            </a:pPr>
+            <a:r>
+              <a:rPr lang="en-US"/>
+              <a:t>2024-04-25         JacekKowalczyk82.org               2</a:t>
+            </a:r>
+            <a:endParaRPr lang="en-US"/>
           </a:p>
         </p:txBody>
       </p:sp>
@@ -3250,7 +3164,7 @@
       </p:grpSpPr>
       <p:sp xmlns:r="http://schemas.openxmlformats.org/officeDocument/2006/relationships" xmlns:p14="http://schemas.microsoft.com/office/powerpoint/2010/main" xmlns:p15="http://schemas.microsoft.com/office/powerpoint/2012/main" xmlns:mc="http://schemas.openxmlformats.org/markup-compatibility/2006">
         <p:nvSpPr>
-          <p:cNvPr id="10" name="PlaceHolder 1"/>
+          <p:cNvPr id="7" name="PlaceHolder 1"/>
           <p:cNvSpPr>
             <a:spLocks noGrp="1"/>
           </p:cNvSpPr>
@@ -3260,8 +3174,8 @@
         </p:nvSpPr>
         <p:spPr>
           <a:xfrm>
-            <a:off x="540000" y="180000"/>
-            <a:ext cx="8279280" cy="629280"/>
+            <a:off x="503640" y="225720"/>
+            <a:ext cx="9066240" cy="944280"/>
           </a:xfrm>
           <a:prstGeom prst="rect">
             <a:avLst/>
@@ -3289,29 +3203,9 @@
           </a:p>
         </p:txBody>
       </p:sp>
-      <p:sp xmlns:p14="http://schemas.microsoft.com/office/powerpoint/2010/main" xmlns:r="http://schemas.openxmlformats.org/officeDocument/2006/relationships" xmlns:p15="http://schemas.microsoft.com/office/powerpoint/2012/main" xmlns:mc="http://schemas.openxmlformats.org/markup-compatibility/2006">
-        <p:nvSpPr>
-          <p:cNvPr id="2" name="PlaceHolder 1"/>
-          <p:cNvSpPr>
-            <a:spLocks noGrp="1"/>
-          </p:cNvSpPr>
-          <p:nvPr>
-            <p:ph idx="2" type="sldNum"/>
-          </p:nvPr>
-        </p:nvSpPr>
-        <p:spPr/>
-        <p:txBody>
-          <a:bodyPr/>
-          <a:p>
-            <a:fld id="{E929433E-D9D0-4402-AC2F-718B8E56A960}" type="slidenum">
-              <a:t>1</a:t>
-            </a:fld>
-          </a:p>
-        </p:txBody>
-      </p:sp>
-      <p:sp>
-        <p:nvSpPr>
-          <p:cNvPr name="TextBox 3" id="3"/>
+      <p:sp>
+        <p:nvSpPr>
+          <p:cNvPr name="TextBox 2" id="2"/>
           <p:cNvSpPr txBox="true"/>
           <p:nvPr>
             <p:ph type="obj"/>
@@ -3342,6 +3236,38 @@
 # Running the default DummyPresentation 
 code2present/build/install/code2present/bin/code2present</a:t>
             </a:r>
+          </a:p>
+        </p:txBody>
+      </p:sp>
+      <p:sp>
+        <p:nvSpPr>
+          <p:cNvPr name="TextBox 3" id="3"/>
+          <p:cNvSpPr txBox="true"/>
+          <p:nvPr>
+            <p:ph type="ftr"/>
+          </p:nvPr>
+        </p:nvSpPr>
+        <p:spPr>
+          <a:xfrm>
+            <a:off x="5080000" y="5080000"/>
+            <a:ext cx="3810000" cy="508000"/>
+          </a:xfrm>
+          <a:prstGeom prst="rect">
+            <a:avLst/>
+          </a:prstGeom>
+        </p:spPr>
+        <p:txBody>
+          <a:bodyPr anchor="t" rtlCol="false"/>
+          <a:lstStyle/>
+          <a:p>
+            <a:pPr algn="l">
+              <a:defRPr/>
+            </a:pPr>
+            <a:r>
+              <a:rPr lang="en-US"/>
+              <a:t>2024-04-25         JacekKowalczyk82.org               3</a:t>
+            </a:r>
+            <a:endParaRPr lang="en-US"/>
           </a:p>
         </p:txBody>
       </p:sp>
@@ -3397,7 +3323,7 @@
       </p:grpSpPr>
       <p:sp xmlns:r="http://schemas.openxmlformats.org/officeDocument/2006/relationships" xmlns:p14="http://schemas.microsoft.com/office/powerpoint/2010/main" xmlns:p15="http://schemas.microsoft.com/office/powerpoint/2012/main" xmlns:mc="http://schemas.openxmlformats.org/markup-compatibility/2006">
         <p:nvSpPr>
-          <p:cNvPr id="10" name="PlaceHolder 1"/>
+          <p:cNvPr id="7" name="PlaceHolder 1"/>
           <p:cNvSpPr>
             <a:spLocks noGrp="1"/>
           </p:cNvSpPr>
@@ -3407,8 +3333,8 @@
         </p:nvSpPr>
         <p:spPr>
           <a:xfrm>
-            <a:off x="540000" y="180000"/>
-            <a:ext cx="8279280" cy="629280"/>
+            <a:off x="503640" y="225720"/>
+            <a:ext cx="9066240" cy="944280"/>
           </a:xfrm>
           <a:prstGeom prst="rect">
             <a:avLst/>
@@ -3436,29 +3362,9 @@
           </a:p>
         </p:txBody>
       </p:sp>
-      <p:sp xmlns:p14="http://schemas.microsoft.com/office/powerpoint/2010/main" xmlns:r="http://schemas.openxmlformats.org/officeDocument/2006/relationships" xmlns:p15="http://schemas.microsoft.com/office/powerpoint/2012/main" xmlns:mc="http://schemas.openxmlformats.org/markup-compatibility/2006">
-        <p:nvSpPr>
-          <p:cNvPr id="2" name="PlaceHolder 1"/>
-          <p:cNvSpPr>
-            <a:spLocks noGrp="1"/>
-          </p:cNvSpPr>
-          <p:nvPr>
-            <p:ph idx="2" type="sldNum"/>
-          </p:nvPr>
-        </p:nvSpPr>
-        <p:spPr/>
-        <p:txBody>
-          <a:bodyPr/>
-          <a:p>
-            <a:fld id="{E929433E-D9D0-4402-AC2F-718B8E56A960}" type="slidenum">
-              <a:t>1</a:t>
-            </a:fld>
-          </a:p>
-        </p:txBody>
-      </p:sp>
-      <p:sp>
-        <p:nvSpPr>
-          <p:cNvPr name="TextBox 3" id="3"/>
+      <p:sp>
+        <p:nvSpPr>
+          <p:cNvPr name="TextBox 2" id="2"/>
           <p:cNvSpPr txBox="true"/>
           <p:nvPr>
             <p:ph type="obj"/>
@@ -3491,6 +3397,38 @@
 } 
 </a:t>
             </a:r>
+          </a:p>
+        </p:txBody>
+      </p:sp>
+      <p:sp>
+        <p:nvSpPr>
+          <p:cNvPr name="TextBox 3" id="3"/>
+          <p:cNvSpPr txBox="true"/>
+          <p:nvPr>
+            <p:ph type="ftr"/>
+          </p:nvPr>
+        </p:nvSpPr>
+        <p:spPr>
+          <a:xfrm>
+            <a:off x="5080000" y="5080000"/>
+            <a:ext cx="3810000" cy="508000"/>
+          </a:xfrm>
+          <a:prstGeom prst="rect">
+            <a:avLst/>
+          </a:prstGeom>
+        </p:spPr>
+        <p:txBody>
+          <a:bodyPr anchor="t" rtlCol="false"/>
+          <a:lstStyle/>
+          <a:p>
+            <a:pPr algn="l">
+              <a:defRPr/>
+            </a:pPr>
+            <a:r>
+              <a:rPr lang="en-US"/>
+              <a:t>2024-04-25         JacekKowalczyk82.org               5</a:t>
+            </a:r>
+            <a:endParaRPr lang="en-US"/>
           </a:p>
         </p:txBody>
       </p:sp>
@@ -3521,7 +3459,7 @@
       </p:grpSpPr>
       <p:sp xmlns:r="http://schemas.openxmlformats.org/officeDocument/2006/relationships" xmlns:p14="http://schemas.microsoft.com/office/powerpoint/2010/main" xmlns:p15="http://schemas.microsoft.com/office/powerpoint/2012/main" xmlns:mc="http://schemas.openxmlformats.org/markup-compatibility/2006">
         <p:nvSpPr>
-          <p:cNvPr id="10" name="PlaceHolder 1"/>
+          <p:cNvPr id="7" name="PlaceHolder 1"/>
           <p:cNvSpPr>
             <a:spLocks noGrp="1"/>
           </p:cNvSpPr>
@@ -3531,8 +3469,8 @@
         </p:nvSpPr>
         <p:spPr>
           <a:xfrm>
-            <a:off x="540000" y="180000"/>
-            <a:ext cx="8279280" cy="629280"/>
+            <a:off x="503640" y="225720"/>
+            <a:ext cx="9066240" cy="944280"/>
           </a:xfrm>
           <a:prstGeom prst="rect">
             <a:avLst/>
@@ -3560,23 +3498,31 @@
           </a:p>
         </p:txBody>
       </p:sp>
-      <p:sp xmlns:p14="http://schemas.microsoft.com/office/powerpoint/2010/main" xmlns:r="http://schemas.openxmlformats.org/officeDocument/2006/relationships" xmlns:p15="http://schemas.microsoft.com/office/powerpoint/2012/main" xmlns:mc="http://schemas.openxmlformats.org/markup-compatibility/2006">
-        <p:nvSpPr>
-          <p:cNvPr id="2" name="PlaceHolder 1"/>
-          <p:cNvSpPr>
-            <a:spLocks noGrp="1"/>
-          </p:cNvSpPr>
-          <p:nvPr>
-            <p:ph idx="2" type="sldNum"/>
-          </p:nvPr>
-        </p:nvSpPr>
-        <p:spPr/>
-        <p:txBody>
-          <a:bodyPr/>
-          <a:p>
-            <a:fld id="{E929433E-D9D0-4402-AC2F-718B8E56A960}" type="slidenum">
-              <a:t>1</a:t>
-            </a:fld>
+      <p:sp>
+        <p:nvSpPr>
+          <p:cNvPr name="TextBox 2" id="2"/>
+          <p:cNvSpPr txBox="true"/>
+          <p:nvPr>
+            <p:ph type="obj"/>
+          </p:nvPr>
+        </p:nvSpPr>
+        <p:spPr>
+          <a:xfrm>
+            <a:off x="635000" y="1270000"/>
+            <a:ext cx="8636000" cy="3810000"/>
+          </a:xfrm>
+          <a:prstGeom prst="rect">
+            <a:avLst/>
+          </a:prstGeom>
+        </p:spPr>
+        <p:txBody>
+          <a:bodyPr anchor="t" rtlCol="false"/>
+          <a:lstStyle/>
+          <a:p>
+            <a:r>
+              <a:rPr lang="en-US"/>
+              <a:t>this is a paragraph text on the slide 2</a:t>
+            </a:r>
           </a:p>
         </p:txBody>
       </p:sp>
@@ -3585,13 +3531,13 @@
           <p:cNvPr name="TextBox 3" id="3"/>
           <p:cNvSpPr txBox="true"/>
           <p:nvPr>
-            <p:ph type="obj"/>
-          </p:nvPr>
-        </p:nvSpPr>
-        <p:spPr>
-          <a:xfrm>
-            <a:off x="635000" y="1270000"/>
-            <a:ext cx="8636000" cy="3810000"/>
+            <p:ph type="ftr"/>
+          </p:nvPr>
+        </p:nvSpPr>
+        <p:spPr>
+          <a:xfrm>
+            <a:off x="5080000" y="5080000"/>
+            <a:ext cx="3810000" cy="508000"/>
           </a:xfrm>
           <a:prstGeom prst="rect">
             <a:avLst/>
@@ -3601,10 +3547,14 @@
           <a:bodyPr anchor="t" rtlCol="false"/>
           <a:lstStyle/>
           <a:p>
+            <a:pPr algn="l">
+              <a:defRPr/>
+            </a:pPr>
             <a:r>
               <a:rPr lang="en-US"/>
-              <a:t>this is a paragraph text on the slide 2</a:t>
-            </a:r>
+              <a:t>2024-04-25         JacekKowalczyk82.org               6</a:t>
+            </a:r>
+            <a:endParaRPr lang="en-US"/>
           </a:p>
         </p:txBody>
       </p:sp>
@@ -3635,7 +3585,7 @@
       </p:grpSpPr>
       <p:sp xmlns:r="http://schemas.openxmlformats.org/officeDocument/2006/relationships" xmlns:p14="http://schemas.microsoft.com/office/powerpoint/2010/main" xmlns:p15="http://schemas.microsoft.com/office/powerpoint/2012/main" xmlns:mc="http://schemas.openxmlformats.org/markup-compatibility/2006">
         <p:nvSpPr>
-          <p:cNvPr id="10" name="PlaceHolder 1"/>
+          <p:cNvPr id="7" name="PlaceHolder 1"/>
           <p:cNvSpPr>
             <a:spLocks noGrp="1"/>
           </p:cNvSpPr>
@@ -3645,8 +3595,8 @@
         </p:nvSpPr>
         <p:spPr>
           <a:xfrm>
-            <a:off x="540000" y="180000"/>
-            <a:ext cx="8279280" cy="629280"/>
+            <a:off x="503640" y="225720"/>
+            <a:ext cx="9066240" cy="944280"/>
           </a:xfrm>
           <a:prstGeom prst="rect">
             <a:avLst/>
@@ -3674,29 +3624,9 @@
           </a:p>
         </p:txBody>
       </p:sp>
-      <p:sp xmlns:p14="http://schemas.microsoft.com/office/powerpoint/2010/main" xmlns:r="http://schemas.openxmlformats.org/officeDocument/2006/relationships" xmlns:p15="http://schemas.microsoft.com/office/powerpoint/2012/main" xmlns:mc="http://schemas.openxmlformats.org/markup-compatibility/2006">
-        <p:nvSpPr>
-          <p:cNvPr id="2" name="PlaceHolder 1"/>
-          <p:cNvSpPr>
-            <a:spLocks noGrp="1"/>
-          </p:cNvSpPr>
-          <p:nvPr>
-            <p:ph idx="2" type="sldNum"/>
-          </p:nvPr>
-        </p:nvSpPr>
-        <p:spPr/>
-        <p:txBody>
-          <a:bodyPr/>
-          <a:p>
-            <a:fld id="{E929433E-D9D0-4402-AC2F-718B8E56A960}" type="slidenum">
-              <a:t>1</a:t>
-            </a:fld>
-          </a:p>
-        </p:txBody>
-      </p:sp>
-      <p:sp>
-        <p:nvSpPr>
-          <p:cNvPr name="TextBox 3" id="3"/>
+      <p:sp>
+        <p:nvSpPr>
+          <p:cNvPr name="TextBox 2" id="2"/>
           <p:cNvSpPr txBox="true"/>
           <p:nvPr>
             <p:ph type="obj"/>
@@ -3743,6 +3673,38 @@
               <a:rPr lang="en-US"/>
               <a:t>Element 3</a:t>
             </a:r>
+          </a:p>
+        </p:txBody>
+      </p:sp>
+      <p:sp>
+        <p:nvSpPr>
+          <p:cNvPr name="TextBox 3" id="3"/>
+          <p:cNvSpPr txBox="true"/>
+          <p:nvPr>
+            <p:ph type="ftr"/>
+          </p:nvPr>
+        </p:nvSpPr>
+        <p:spPr>
+          <a:xfrm>
+            <a:off x="5080000" y="5080000"/>
+            <a:ext cx="3810000" cy="508000"/>
+          </a:xfrm>
+          <a:prstGeom prst="rect">
+            <a:avLst/>
+          </a:prstGeom>
+        </p:spPr>
+        <p:txBody>
+          <a:bodyPr anchor="t" rtlCol="false"/>
+          <a:lstStyle/>
+          <a:p>
+            <a:pPr algn="l">
+              <a:defRPr/>
+            </a:pPr>
+            <a:r>
+              <a:rPr lang="en-US"/>
+              <a:t>2024-04-25         JacekKowalczyk82.org               7</a:t>
+            </a:r>
+            <a:endParaRPr lang="en-US"/>
           </a:p>
         </p:txBody>
       </p:sp>
@@ -3773,7 +3735,7 @@
       </p:grpSpPr>
       <p:sp xmlns:r="http://schemas.openxmlformats.org/officeDocument/2006/relationships" xmlns:p14="http://schemas.microsoft.com/office/powerpoint/2010/main" xmlns:p15="http://schemas.microsoft.com/office/powerpoint/2012/main" xmlns:mc="http://schemas.openxmlformats.org/markup-compatibility/2006">
         <p:nvSpPr>
-          <p:cNvPr id="10" name="PlaceHolder 1"/>
+          <p:cNvPr id="7" name="PlaceHolder 1"/>
           <p:cNvSpPr>
             <a:spLocks noGrp="1"/>
           </p:cNvSpPr>
@@ -3783,8 +3745,8 @@
         </p:nvSpPr>
         <p:spPr>
           <a:xfrm>
-            <a:off x="540000" y="180000"/>
-            <a:ext cx="8279280" cy="629280"/>
+            <a:off x="503640" y="225720"/>
+            <a:ext cx="9066240" cy="944280"/>
           </a:xfrm>
           <a:prstGeom prst="rect">
             <a:avLst/>
@@ -3812,23 +3774,31 @@
           </a:p>
         </p:txBody>
       </p:sp>
-      <p:sp xmlns:p14="http://schemas.microsoft.com/office/powerpoint/2010/main" xmlns:r="http://schemas.openxmlformats.org/officeDocument/2006/relationships" xmlns:p15="http://schemas.microsoft.com/office/powerpoint/2012/main" xmlns:mc="http://schemas.openxmlformats.org/markup-compatibility/2006">
-        <p:nvSpPr>
-          <p:cNvPr id="2" name="PlaceHolder 1"/>
-          <p:cNvSpPr>
-            <a:spLocks noGrp="1"/>
-          </p:cNvSpPr>
-          <p:nvPr>
-            <p:ph idx="2" type="sldNum"/>
-          </p:nvPr>
-        </p:nvSpPr>
-        <p:spPr/>
-        <p:txBody>
-          <a:bodyPr/>
-          <a:p>
-            <a:fld id="{E929433E-D9D0-4402-AC2F-718B8E56A960}" type="slidenum">
-              <a:t>1</a:t>
-            </a:fld>
+      <p:sp>
+        <p:nvSpPr>
+          <p:cNvPr name="TextBox 2" id="2"/>
+          <p:cNvSpPr txBox="true"/>
+          <p:nvPr>
+            <p:ph type="obj"/>
+          </p:nvPr>
+        </p:nvSpPr>
+        <p:spPr>
+          <a:xfrm>
+            <a:off x="635000" y="1270000"/>
+            <a:ext cx="8636000" cy="3810000"/>
+          </a:xfrm>
+          <a:prstGeom prst="rect">
+            <a:avLst/>
+          </a:prstGeom>
+        </p:spPr>
+        <p:txBody>
+          <a:bodyPr anchor="t" rtlCol="false"/>
+          <a:lstStyle/>
+          <a:p>
+            <a:r>
+              <a:rPr lang="en-US"/>
+              <a:t>The next slide will be empty</a:t>
+            </a:r>
           </a:p>
         </p:txBody>
       </p:sp>
@@ -3837,13 +3807,13 @@
           <p:cNvPr name="TextBox 3" id="3"/>
           <p:cNvSpPr txBox="true"/>
           <p:nvPr>
-            <p:ph type="obj"/>
-          </p:nvPr>
-        </p:nvSpPr>
-        <p:spPr>
-          <a:xfrm>
-            <a:off x="635000" y="1270000"/>
-            <a:ext cx="8636000" cy="3810000"/>
+            <p:ph type="ftr"/>
+          </p:nvPr>
+        </p:nvSpPr>
+        <p:spPr>
+          <a:xfrm>
+            <a:off x="5080000" y="5080000"/>
+            <a:ext cx="3810000" cy="508000"/>
           </a:xfrm>
           <a:prstGeom prst="rect">
             <a:avLst/>
@@ -3853,10 +3823,14 @@
           <a:bodyPr anchor="t" rtlCol="false"/>
           <a:lstStyle/>
           <a:p>
+            <a:pPr algn="l">
+              <a:defRPr/>
+            </a:pPr>
             <a:r>
               <a:rPr lang="en-US"/>
-              <a:t>The next slide will be empty</a:t>
-            </a:r>
+              <a:t>2024-04-25         JacekKowalczyk82.org               8</a:t>
+            </a:r>
+            <a:endParaRPr lang="en-US"/>
           </a:p>
         </p:txBody>
       </p:sp>

</xml_diff>

<commit_message>
adding content with font size as param,  added YAML tools
</commit_message>
<xml_diff>
--- a/HowTo-presentation.pptx
+++ b/HowTo-presentation.pptx
@@ -2734,7 +2734,7 @@
         <p:spPr>
           <a:xfrm>
             <a:off x="635000" y="635000"/>
-            <a:ext cx="7620000" cy="1270000"/>
+            <a:ext cx="8890000" cy="1270000"/>
           </a:xfrm>
           <a:prstGeom prst="rect">
             <a:avLst/>
@@ -2766,7 +2766,7 @@
         <p:spPr>
           <a:xfrm>
             <a:off x="2540000" y="2540000"/>
-            <a:ext cx="5080000" cy="1270000"/>
+            <a:ext cx="6350000" cy="1270000"/>
           </a:xfrm>
           <a:prstGeom prst="rect">
             <a:avLst/>
@@ -2842,50 +2842,41 @@
           <a:chExt cx="0" cy="0"/>
         </a:xfrm>
       </p:grpSpPr>
-      <p:sp xmlns:r="http://schemas.openxmlformats.org/officeDocument/2006/relationships" xmlns:p14="http://schemas.microsoft.com/office/powerpoint/2010/main" xmlns:p15="http://schemas.microsoft.com/office/powerpoint/2012/main" xmlns:mc="http://schemas.openxmlformats.org/markup-compatibility/2006">
-        <p:nvSpPr>
-          <p:cNvPr id="7" name="PlaceHolder 1"/>
-          <p:cNvSpPr>
-            <a:spLocks noGrp="1"/>
-          </p:cNvSpPr>
+      <p:sp>
+        <p:nvSpPr>
+          <p:cNvPr name="TextBox 2" id="2"/>
+          <p:cNvSpPr txBox="true"/>
           <p:nvPr>
             <p:ph type="title"/>
           </p:nvPr>
         </p:nvSpPr>
         <p:spPr>
           <a:xfrm>
-            <a:off x="503640" y="225720"/>
-            <a:ext cx="9066240" cy="944280"/>
-          </a:xfrm>
-          <a:prstGeom prst="rect">
-            <a:avLst/>
-          </a:prstGeom>
-          <a:noFill/>
-          <a:ln w="0">
-            <a:noFill/>
-          </a:ln>
-        </p:spPr>
-        <p:txBody>
-          <a:bodyPr lIns="0" rIns="0" tIns="0" bIns="0" anchor="ctr">
-            <a:noAutofit/>
-          </a:bodyPr>
-          <a:p>
-            <a:pPr algn="ctr">
-              <a:buNone/>
+            <a:off x="635000" y="381000"/>
+            <a:ext cx="8890000" cy="1016000"/>
+          </a:xfrm>
+          <a:prstGeom prst="rect">
+            <a:avLst/>
+          </a:prstGeom>
+        </p:spPr>
+        <p:txBody>
+          <a:bodyPr anchor="t" rtlCol="false"/>
+          <a:lstStyle/>
+          <a:p>
+            <a:pPr algn="l">
+              <a:defRPr/>
             </a:pPr>
             <a:r>
               <a:rPr lang="en-US"/>
               <a:t>Setup ubuntu dev env</a:t>
             </a:r>
-            <a:endParaRPr b="0" lang="en-US" sz="4400" spc="-1" strike="noStrike">
-              <a:latin typeface="Arial"/>
-            </a:endParaRPr>
-          </a:p>
-        </p:txBody>
-      </p:sp>
-      <p:sp>
-        <p:nvSpPr>
-          <p:cNvPr name="TextBox 2" id="2"/>
+            <a:endParaRPr lang="en-US"/>
+          </a:p>
+        </p:txBody>
+      </p:sp>
+      <p:sp>
+        <p:nvSpPr>
+          <p:cNvPr name="TextBox 3" id="3"/>
           <p:cNvSpPr txBox="true"/>
           <p:nvPr>
             <p:ph type="obj"/>
@@ -2909,7 +2900,7 @@
               <a:buChar char="•"/>
             </a:pPr>
             <a:r>
-              <a:rPr lang="en-US"/>
+              <a:rPr lang="en-US" sz="1400"/>
               <a:t>curl -s "https://get.sdkman.io" | bash</a:t>
             </a:r>
           </a:p>
@@ -2919,7 +2910,7 @@
               <a:buChar char="•"/>
             </a:pPr>
             <a:r>
-              <a:rPr lang="en-US"/>
+              <a:rPr lang="en-US" sz="1400"/>
               <a:t>source "/home/ubuntu/.sdkman/bin/sdkman-init.sh"</a:t>
             </a:r>
           </a:p>
@@ -2929,7 +2920,7 @@
               <a:buChar char="•"/>
             </a:pPr>
             <a:r>
-              <a:rPr lang="en-US"/>
+              <a:rPr lang="en-US" sz="1400"/>
               <a:t>sdk install gradle</a:t>
             </a:r>
           </a:p>
@@ -2939,7 +2930,7 @@
               <a:buChar char="•"/>
             </a:pPr>
             <a:r>
-              <a:rPr lang="en-US"/>
+              <a:rPr lang="en-US" sz="1400"/>
               <a:t>sdk install java 11.0.22-tem</a:t>
             </a:r>
           </a:p>
@@ -2949,7 +2940,7 @@
               <a:buChar char="•"/>
             </a:pPr>
             <a:r>
-              <a:rPr lang="en-US"/>
+              <a:rPr lang="en-US" sz="1400"/>
               <a:t>gradle init</a:t>
             </a:r>
           </a:p>
@@ -2957,7 +2948,7 @@
       </p:sp>
       <p:sp>
         <p:nvSpPr>
-          <p:cNvPr name="TextBox 3" id="3"/>
+          <p:cNvPr name="TextBox 4" id="4"/>
           <p:cNvSpPr txBox="true"/>
           <p:nvPr>
             <p:ph type="ftr"/>
@@ -2981,7 +2972,7 @@
             </a:pPr>
             <a:r>
               <a:rPr lang="en-US"/>
-              <a:t>2024-04-25         JacekKowalczyk82.org               1</a:t>
+              <a:t>2024-04-26         JacekKowalczyk82.org               1</a:t>
             </a:r>
             <a:endParaRPr lang="en-US"/>
           </a:p>
@@ -3012,50 +3003,41 @@
           <a:chExt cx="0" cy="0"/>
         </a:xfrm>
       </p:grpSpPr>
-      <p:sp xmlns:r="http://schemas.openxmlformats.org/officeDocument/2006/relationships" xmlns:p14="http://schemas.microsoft.com/office/powerpoint/2010/main" xmlns:p15="http://schemas.microsoft.com/office/powerpoint/2012/main" xmlns:mc="http://schemas.openxmlformats.org/markup-compatibility/2006">
-        <p:nvSpPr>
-          <p:cNvPr id="7" name="PlaceHolder 1"/>
-          <p:cNvSpPr>
-            <a:spLocks noGrp="1"/>
-          </p:cNvSpPr>
+      <p:sp>
+        <p:nvSpPr>
+          <p:cNvPr name="TextBox 2" id="2"/>
+          <p:cNvSpPr txBox="true"/>
           <p:nvPr>
             <p:ph type="title"/>
           </p:nvPr>
         </p:nvSpPr>
         <p:spPr>
           <a:xfrm>
-            <a:off x="503640" y="225720"/>
-            <a:ext cx="9066240" cy="944280"/>
-          </a:xfrm>
-          <a:prstGeom prst="rect">
-            <a:avLst/>
-          </a:prstGeom>
-          <a:noFill/>
-          <a:ln w="0">
-            <a:noFill/>
-          </a:ln>
-        </p:spPr>
-        <p:txBody>
-          <a:bodyPr lIns="0" rIns="0" tIns="0" bIns="0" anchor="ctr">
-            <a:noAutofit/>
-          </a:bodyPr>
-          <a:p>
-            <a:pPr algn="ctr">
-              <a:buNone/>
+            <a:off x="635000" y="381000"/>
+            <a:ext cx="8890000" cy="1016000"/>
+          </a:xfrm>
+          <a:prstGeom prst="rect">
+            <a:avLst/>
+          </a:prstGeom>
+        </p:spPr>
+        <p:txBody>
+          <a:bodyPr anchor="t" rtlCol="false"/>
+          <a:lstStyle/>
+          <a:p>
+            <a:pPr algn="l">
+              <a:defRPr/>
             </a:pPr>
             <a:r>
               <a:rPr lang="en-US"/>
               <a:t>knowledge and links</a:t>
             </a:r>
-            <a:endParaRPr b="0" lang="en-US" sz="4400" spc="-1" strike="noStrike">
-              <a:latin typeface="Arial"/>
-            </a:endParaRPr>
-          </a:p>
-        </p:txBody>
-      </p:sp>
-      <p:sp>
-        <p:nvSpPr>
-          <p:cNvPr name="TextBox 2" id="2"/>
+            <a:endParaRPr lang="en-US"/>
+          </a:p>
+        </p:txBody>
+      </p:sp>
+      <p:sp>
+        <p:nvSpPr>
+          <p:cNvPr name="TextBox 3" id="3"/>
           <p:cNvSpPr txBox="true"/>
           <p:nvPr>
             <p:ph type="obj"/>
@@ -3079,7 +3061,7 @@
               <a:buChar char="•"/>
             </a:pPr>
             <a:r>
-              <a:rPr lang="en-US"/>
+              <a:rPr lang="en-US" sz="1400"/>
               <a:t>https://www.baeldung.com/apache-poi-slideshow</a:t>
             </a:r>
           </a:p>
@@ -3089,7 +3071,7 @@
               <a:buChar char="•"/>
             </a:pPr>
             <a:r>
-              <a:rPr lang="en-US"/>
+              <a:rPr lang="en-US" sz="1400"/>
               <a:t>shttps://poi.apache.org/components/slideshow/xslf-cookbook.html</a:t>
             </a:r>
           </a:p>
@@ -3099,7 +3081,7 @@
               <a:buChar char="•"/>
             </a:pPr>
             <a:r>
-              <a:rPr lang="en-US"/>
+              <a:rPr lang="en-US" sz="1400"/>
               <a:t>https://github.com/eugenp/tutorials/blob/master/apache-poi-2/src/main/java/com/baeldung/poi/powerpoint/PowerPointHelper.java</a:t>
             </a:r>
           </a:p>
@@ -3107,7 +3089,7 @@
       </p:sp>
       <p:sp>
         <p:nvSpPr>
-          <p:cNvPr name="TextBox 3" id="3"/>
+          <p:cNvPr name="TextBox 4" id="4"/>
           <p:cNvSpPr txBox="true"/>
           <p:nvPr>
             <p:ph type="ftr"/>
@@ -3131,7 +3113,7 @@
             </a:pPr>
             <a:r>
               <a:rPr lang="en-US"/>
-              <a:t>2024-04-25         JacekKowalczyk82.org               2</a:t>
+              <a:t>2024-04-26         JacekKowalczyk82.org               2</a:t>
             </a:r>
             <a:endParaRPr lang="en-US"/>
           </a:p>
@@ -3162,50 +3144,41 @@
           <a:chExt cx="0" cy="0"/>
         </a:xfrm>
       </p:grpSpPr>
-      <p:sp xmlns:r="http://schemas.openxmlformats.org/officeDocument/2006/relationships" xmlns:p14="http://schemas.microsoft.com/office/powerpoint/2010/main" xmlns:p15="http://schemas.microsoft.com/office/powerpoint/2012/main" xmlns:mc="http://schemas.openxmlformats.org/markup-compatibility/2006">
-        <p:nvSpPr>
-          <p:cNvPr id="7" name="PlaceHolder 1"/>
-          <p:cNvSpPr>
-            <a:spLocks noGrp="1"/>
-          </p:cNvSpPr>
+      <p:sp>
+        <p:nvSpPr>
+          <p:cNvPr name="TextBox 2" id="2"/>
+          <p:cNvSpPr txBox="true"/>
           <p:nvPr>
             <p:ph type="title"/>
           </p:nvPr>
         </p:nvSpPr>
         <p:spPr>
           <a:xfrm>
-            <a:off x="503640" y="225720"/>
-            <a:ext cx="9066240" cy="944280"/>
-          </a:xfrm>
-          <a:prstGeom prst="rect">
-            <a:avLst/>
-          </a:prstGeom>
-          <a:noFill/>
-          <a:ln w="0">
-            <a:noFill/>
-          </a:ln>
-        </p:spPr>
-        <p:txBody>
-          <a:bodyPr lIns="0" rIns="0" tIns="0" bIns="0" anchor="ctr">
-            <a:noAutofit/>
-          </a:bodyPr>
-          <a:p>
-            <a:pPr algn="ctr">
-              <a:buNone/>
+            <a:off x="635000" y="381000"/>
+            <a:ext cx="8890000" cy="1016000"/>
+          </a:xfrm>
+          <a:prstGeom prst="rect">
+            <a:avLst/>
+          </a:prstGeom>
+        </p:spPr>
+        <p:txBody>
+          <a:bodyPr anchor="t" rtlCol="false"/>
+          <a:lstStyle/>
+          <a:p>
+            <a:pPr algn="l">
+              <a:defRPr/>
             </a:pPr>
             <a:r>
               <a:rPr lang="en-US"/>
               <a:t>Building and running</a:t>
             </a:r>
-            <a:endParaRPr b="0" lang="en-US" sz="4400" spc="-1" strike="noStrike">
-              <a:latin typeface="Arial"/>
-            </a:endParaRPr>
-          </a:p>
-        </p:txBody>
-      </p:sp>
-      <p:sp>
-        <p:nvSpPr>
-          <p:cNvPr name="TextBox 2" id="2"/>
+            <a:endParaRPr lang="en-US"/>
+          </a:p>
+        </p:txBody>
+      </p:sp>
+      <p:sp>
+        <p:nvSpPr>
+          <p:cNvPr name="TextBox 3" id="3"/>
           <p:cNvSpPr txBox="true"/>
           <p:nvPr>
             <p:ph type="obj"/>
@@ -3225,7 +3198,7 @@
           <a:lstStyle/>
           <a:p>
             <a:r>
-              <a:rPr lang="en-US" sz="1600">
+              <a:rPr lang="en-US" sz="1400">
                 <a:solidFill>
                   <a:srgbClr val="808080"/>
                 </a:solidFill>
@@ -3241,7 +3214,7 @@
       </p:sp>
       <p:sp>
         <p:nvSpPr>
-          <p:cNvPr name="TextBox 3" id="3"/>
+          <p:cNvPr name="TextBox 4" id="4"/>
           <p:cNvSpPr txBox="true"/>
           <p:nvPr>
             <p:ph type="ftr"/>
@@ -3265,7 +3238,7 @@
             </a:pPr>
             <a:r>
               <a:rPr lang="en-US"/>
-              <a:t>2024-04-25         JacekKowalczyk82.org               3</a:t>
+              <a:t>2024-04-26         JacekKowalczyk82.org               3</a:t>
             </a:r>
             <a:endParaRPr lang="en-US"/>
           </a:p>
@@ -3321,50 +3294,41 @@
           <a:chExt cx="0" cy="0"/>
         </a:xfrm>
       </p:grpSpPr>
-      <p:sp xmlns:r="http://schemas.openxmlformats.org/officeDocument/2006/relationships" xmlns:p14="http://schemas.microsoft.com/office/powerpoint/2010/main" xmlns:p15="http://schemas.microsoft.com/office/powerpoint/2012/main" xmlns:mc="http://schemas.openxmlformats.org/markup-compatibility/2006">
-        <p:nvSpPr>
-          <p:cNvPr id="7" name="PlaceHolder 1"/>
-          <p:cNvSpPr>
-            <a:spLocks noGrp="1"/>
-          </p:cNvSpPr>
+      <p:sp>
+        <p:nvSpPr>
+          <p:cNvPr name="TextBox 2" id="2"/>
+          <p:cNvSpPr txBox="true"/>
           <p:nvPr>
             <p:ph type="title"/>
           </p:nvPr>
         </p:nvSpPr>
         <p:spPr>
           <a:xfrm>
-            <a:off x="503640" y="225720"/>
-            <a:ext cx="9066240" cy="944280"/>
-          </a:xfrm>
-          <a:prstGeom prst="rect">
-            <a:avLst/>
-          </a:prstGeom>
-          <a:noFill/>
-          <a:ln w="0">
-            <a:noFill/>
-          </a:ln>
-        </p:spPr>
-        <p:txBody>
-          <a:bodyPr lIns="0" rIns="0" tIns="0" bIns="0" anchor="ctr">
-            <a:noAutofit/>
-          </a:bodyPr>
-          <a:p>
-            <a:pPr algn="ctr">
-              <a:buNone/>
+            <a:off x="635000" y="381000"/>
+            <a:ext cx="8890000" cy="1016000"/>
+          </a:xfrm>
+          <a:prstGeom prst="rect">
+            <a:avLst/>
+          </a:prstGeom>
+        </p:spPr>
+        <p:txBody>
+          <a:bodyPr anchor="t" rtlCol="false"/>
+          <a:lstStyle/>
+          <a:p>
+            <a:pPr algn="l">
+              <a:defRPr/>
             </a:pPr>
             <a:r>
               <a:rPr lang="en-US"/>
               <a:t>Slide with CODE</a:t>
             </a:r>
-            <a:endParaRPr b="0" lang="en-US" sz="4400" spc="-1" strike="noStrike">
-              <a:latin typeface="Arial"/>
-            </a:endParaRPr>
-          </a:p>
-        </p:txBody>
-      </p:sp>
-      <p:sp>
-        <p:nvSpPr>
-          <p:cNvPr name="TextBox 2" id="2"/>
+            <a:endParaRPr lang="en-US"/>
+          </a:p>
+        </p:txBody>
+      </p:sp>
+      <p:sp>
+        <p:nvSpPr>
+          <p:cNvPr name="TextBox 3" id="3"/>
           <p:cNvSpPr txBox="true"/>
           <p:nvPr>
             <p:ph type="obj"/>
@@ -3384,7 +3348,7 @@
           <a:lstStyle/>
           <a:p>
             <a:r>
-              <a:rPr lang="en-US" sz="1600">
+              <a:rPr lang="en-US" sz="1400">
                 <a:solidFill>
                   <a:srgbClr val="808080"/>
                 </a:solidFill>
@@ -3402,7 +3366,7 @@
       </p:sp>
       <p:sp>
         <p:nvSpPr>
-          <p:cNvPr name="TextBox 3" id="3"/>
+          <p:cNvPr name="TextBox 4" id="4"/>
           <p:cNvSpPr txBox="true"/>
           <p:nvPr>
             <p:ph type="ftr"/>
@@ -3426,7 +3390,7 @@
             </a:pPr>
             <a:r>
               <a:rPr lang="en-US"/>
-              <a:t>2024-04-25         JacekKowalczyk82.org               5</a:t>
+              <a:t>2024-04-26         JacekKowalczyk82.org               5</a:t>
             </a:r>
             <a:endParaRPr lang="en-US"/>
           </a:p>
@@ -3457,50 +3421,41 @@
           <a:chExt cx="0" cy="0"/>
         </a:xfrm>
       </p:grpSpPr>
-      <p:sp xmlns:r="http://schemas.openxmlformats.org/officeDocument/2006/relationships" xmlns:p14="http://schemas.microsoft.com/office/powerpoint/2010/main" xmlns:p15="http://schemas.microsoft.com/office/powerpoint/2012/main" xmlns:mc="http://schemas.openxmlformats.org/markup-compatibility/2006">
-        <p:nvSpPr>
-          <p:cNvPr id="7" name="PlaceHolder 1"/>
-          <p:cNvSpPr>
-            <a:spLocks noGrp="1"/>
-          </p:cNvSpPr>
+      <p:sp>
+        <p:nvSpPr>
+          <p:cNvPr name="TextBox 2" id="2"/>
+          <p:cNvSpPr txBox="true"/>
           <p:nvPr>
             <p:ph type="title"/>
           </p:nvPr>
         </p:nvSpPr>
         <p:spPr>
           <a:xfrm>
-            <a:off x="503640" y="225720"/>
-            <a:ext cx="9066240" cy="944280"/>
-          </a:xfrm>
-          <a:prstGeom prst="rect">
-            <a:avLst/>
-          </a:prstGeom>
-          <a:noFill/>
-          <a:ln w="0">
-            <a:noFill/>
-          </a:ln>
-        </p:spPr>
-        <p:txBody>
-          <a:bodyPr lIns="0" rIns="0" tIns="0" bIns="0" anchor="ctr">
-            <a:noAutofit/>
-          </a:bodyPr>
-          <a:p>
-            <a:pPr algn="ctr">
-              <a:buNone/>
+            <a:off x="635000" y="381000"/>
+            <a:ext cx="8890000" cy="1016000"/>
+          </a:xfrm>
+          <a:prstGeom prst="rect">
+            <a:avLst/>
+          </a:prstGeom>
+        </p:spPr>
+        <p:txBody>
+          <a:bodyPr anchor="t" rtlCol="false"/>
+          <a:lstStyle/>
+          <a:p>
+            <a:pPr algn="l">
+              <a:defRPr/>
             </a:pPr>
             <a:r>
               <a:rPr lang="en-US"/>
               <a:t>Slide with Text</a:t>
             </a:r>
-            <a:endParaRPr b="0" lang="en-US" sz="4400" spc="-1" strike="noStrike">
-              <a:latin typeface="Arial"/>
-            </a:endParaRPr>
-          </a:p>
-        </p:txBody>
-      </p:sp>
-      <p:sp>
-        <p:nvSpPr>
-          <p:cNvPr name="TextBox 2" id="2"/>
+            <a:endParaRPr lang="en-US"/>
+          </a:p>
+        </p:txBody>
+      </p:sp>
+      <p:sp>
+        <p:nvSpPr>
+          <p:cNvPr name="TextBox 3" id="3"/>
           <p:cNvSpPr txBox="true"/>
           <p:nvPr>
             <p:ph type="obj"/>
@@ -3520,7 +3475,7 @@
           <a:lstStyle/>
           <a:p>
             <a:r>
-              <a:rPr lang="en-US"/>
+              <a:rPr lang="en-US" sz="1400"/>
               <a:t>this is a paragraph text on the slide 2</a:t>
             </a:r>
           </a:p>
@@ -3528,7 +3483,7 @@
       </p:sp>
       <p:sp>
         <p:nvSpPr>
-          <p:cNvPr name="TextBox 3" id="3"/>
+          <p:cNvPr name="TextBox 4" id="4"/>
           <p:cNvSpPr txBox="true"/>
           <p:nvPr>
             <p:ph type="ftr"/>
@@ -3552,7 +3507,7 @@
             </a:pPr>
             <a:r>
               <a:rPr lang="en-US"/>
-              <a:t>2024-04-25         JacekKowalczyk82.org               6</a:t>
+              <a:t>2024-04-26         JacekKowalczyk82.org               6</a:t>
             </a:r>
             <a:endParaRPr lang="en-US"/>
           </a:p>
@@ -3583,50 +3538,41 @@
           <a:chExt cx="0" cy="0"/>
         </a:xfrm>
       </p:grpSpPr>
-      <p:sp xmlns:r="http://schemas.openxmlformats.org/officeDocument/2006/relationships" xmlns:p14="http://schemas.microsoft.com/office/powerpoint/2010/main" xmlns:p15="http://schemas.microsoft.com/office/powerpoint/2012/main" xmlns:mc="http://schemas.openxmlformats.org/markup-compatibility/2006">
-        <p:nvSpPr>
-          <p:cNvPr id="7" name="PlaceHolder 1"/>
-          <p:cNvSpPr>
-            <a:spLocks noGrp="1"/>
-          </p:cNvSpPr>
+      <p:sp>
+        <p:nvSpPr>
+          <p:cNvPr name="TextBox 2" id="2"/>
+          <p:cNvSpPr txBox="true"/>
           <p:nvPr>
             <p:ph type="title"/>
           </p:nvPr>
         </p:nvSpPr>
         <p:spPr>
           <a:xfrm>
-            <a:off x="503640" y="225720"/>
-            <a:ext cx="9066240" cy="944280"/>
-          </a:xfrm>
-          <a:prstGeom prst="rect">
-            <a:avLst/>
-          </a:prstGeom>
-          <a:noFill/>
-          <a:ln w="0">
-            <a:noFill/>
-          </a:ln>
-        </p:spPr>
-        <p:txBody>
-          <a:bodyPr lIns="0" rIns="0" tIns="0" bIns="0" anchor="ctr">
-            <a:noAutofit/>
-          </a:bodyPr>
-          <a:p>
-            <a:pPr algn="ctr">
-              <a:buNone/>
+            <a:off x="635000" y="381000"/>
+            <a:ext cx="8890000" cy="1016000"/>
+          </a:xfrm>
+          <a:prstGeom prst="rect">
+            <a:avLst/>
+          </a:prstGeom>
+        </p:spPr>
+        <p:txBody>
+          <a:bodyPr anchor="t" rtlCol="false"/>
+          <a:lstStyle/>
+          <a:p>
+            <a:pPr algn="l">
+              <a:defRPr/>
             </a:pPr>
             <a:r>
               <a:rPr lang="en-US"/>
               <a:t>Slide with Bullet List</a:t>
             </a:r>
-            <a:endParaRPr b="0" lang="en-US" sz="4400" spc="-1" strike="noStrike">
-              <a:latin typeface="Arial"/>
-            </a:endParaRPr>
-          </a:p>
-        </p:txBody>
-      </p:sp>
-      <p:sp>
-        <p:nvSpPr>
-          <p:cNvPr name="TextBox 2" id="2"/>
+            <a:endParaRPr lang="en-US"/>
+          </a:p>
+        </p:txBody>
+      </p:sp>
+      <p:sp>
+        <p:nvSpPr>
+          <p:cNvPr name="TextBox 3" id="3"/>
           <p:cNvSpPr txBox="true"/>
           <p:nvPr>
             <p:ph type="obj"/>
@@ -3650,7 +3596,7 @@
               <a:buChar char="•"/>
             </a:pPr>
             <a:r>
-              <a:rPr lang="en-US"/>
+              <a:rPr lang="en-US" sz="1400"/>
               <a:t>Element 1 </a:t>
             </a:r>
           </a:p>
@@ -3660,7 +3606,7 @@
               <a:buChar char="•"/>
             </a:pPr>
             <a:r>
-              <a:rPr lang="en-US"/>
+              <a:rPr lang="en-US" sz="1400"/>
               <a:t>Element 2</a:t>
             </a:r>
           </a:p>
@@ -3670,7 +3616,7 @@
               <a:buChar char="•"/>
             </a:pPr>
             <a:r>
-              <a:rPr lang="en-US"/>
+              <a:rPr lang="en-US" sz="1400"/>
               <a:t>Element 3</a:t>
             </a:r>
           </a:p>
@@ -3678,7 +3624,7 @@
       </p:sp>
       <p:sp>
         <p:nvSpPr>
-          <p:cNvPr name="TextBox 3" id="3"/>
+          <p:cNvPr name="TextBox 4" id="4"/>
           <p:cNvSpPr txBox="true"/>
           <p:nvPr>
             <p:ph type="ftr"/>
@@ -3702,7 +3648,7 @@
             </a:pPr>
             <a:r>
               <a:rPr lang="en-US"/>
-              <a:t>2024-04-25         JacekKowalczyk82.org               7</a:t>
+              <a:t>2024-04-26         JacekKowalczyk82.org               7</a:t>
             </a:r>
             <a:endParaRPr lang="en-US"/>
           </a:p>
@@ -3733,50 +3679,41 @@
           <a:chExt cx="0" cy="0"/>
         </a:xfrm>
       </p:grpSpPr>
-      <p:sp xmlns:r="http://schemas.openxmlformats.org/officeDocument/2006/relationships" xmlns:p14="http://schemas.microsoft.com/office/powerpoint/2010/main" xmlns:p15="http://schemas.microsoft.com/office/powerpoint/2012/main" xmlns:mc="http://schemas.openxmlformats.org/markup-compatibility/2006">
-        <p:nvSpPr>
-          <p:cNvPr id="7" name="PlaceHolder 1"/>
-          <p:cNvSpPr>
-            <a:spLocks noGrp="1"/>
-          </p:cNvSpPr>
+      <p:sp>
+        <p:nvSpPr>
+          <p:cNvPr name="TextBox 2" id="2"/>
+          <p:cNvSpPr txBox="true"/>
           <p:nvPr>
             <p:ph type="title"/>
           </p:nvPr>
         </p:nvSpPr>
         <p:spPr>
           <a:xfrm>
-            <a:off x="503640" y="225720"/>
-            <a:ext cx="9066240" cy="944280"/>
-          </a:xfrm>
-          <a:prstGeom prst="rect">
-            <a:avLst/>
-          </a:prstGeom>
-          <a:noFill/>
-          <a:ln w="0">
-            <a:noFill/>
-          </a:ln>
-        </p:spPr>
-        <p:txBody>
-          <a:bodyPr lIns="0" rIns="0" tIns="0" bIns="0" anchor="ctr">
-            <a:noAutofit/>
-          </a:bodyPr>
-          <a:p>
-            <a:pPr algn="ctr">
-              <a:buNone/>
+            <a:off x="635000" y="381000"/>
+            <a:ext cx="8890000" cy="1016000"/>
+          </a:xfrm>
+          <a:prstGeom prst="rect">
+            <a:avLst/>
+          </a:prstGeom>
+        </p:spPr>
+        <p:txBody>
+          <a:bodyPr anchor="t" rtlCol="false"/>
+          <a:lstStyle/>
+          <a:p>
+            <a:pPr algn="l">
+              <a:defRPr/>
             </a:pPr>
             <a:r>
               <a:rPr lang="en-US"/>
               <a:t>You can have empty slides</a:t>
             </a:r>
-            <a:endParaRPr b="0" lang="en-US" sz="4400" spc="-1" strike="noStrike">
-              <a:latin typeface="Arial"/>
-            </a:endParaRPr>
-          </a:p>
-        </p:txBody>
-      </p:sp>
-      <p:sp>
-        <p:nvSpPr>
-          <p:cNvPr name="TextBox 2" id="2"/>
+            <a:endParaRPr lang="en-US"/>
+          </a:p>
+        </p:txBody>
+      </p:sp>
+      <p:sp>
+        <p:nvSpPr>
+          <p:cNvPr name="TextBox 3" id="3"/>
           <p:cNvSpPr txBox="true"/>
           <p:nvPr>
             <p:ph type="obj"/>
@@ -3796,7 +3733,7 @@
           <a:lstStyle/>
           <a:p>
             <a:r>
-              <a:rPr lang="en-US"/>
+              <a:rPr lang="en-US" sz="1400"/>
               <a:t>The next slide will be empty</a:t>
             </a:r>
           </a:p>
@@ -3804,7 +3741,7 @@
       </p:sp>
       <p:sp>
         <p:nvSpPr>
-          <p:cNvPr name="TextBox 3" id="3"/>
+          <p:cNvPr name="TextBox 4" id="4"/>
           <p:cNvSpPr txBox="true"/>
           <p:nvPr>
             <p:ph type="ftr"/>
@@ -3828,7 +3765,7 @@
             </a:pPr>
             <a:r>
               <a:rPr lang="en-US"/>
-              <a:t>2024-04-25         JacekKowalczyk82.org               8</a:t>
+              <a:t>2024-04-26         JacekKowalczyk82.org               8</a:t>
             </a:r>
             <a:endParaRPr lang="en-US"/>
           </a:p>

</xml_diff>

<commit_message>
working on new Presentation, model, with JSON or YAML
</commit_message>
<xml_diff>
--- a/HowTo-presentation.pptx
+++ b/HowTo-presentation.pptx
@@ -15,6 +15,7 @@
     <p:sldId id="263" r:id="rId11"/>
     <p:sldId id="264" r:id="rId12"/>
     <p:sldId id="265" r:id="rId13"/>
+    <p:sldId id="266" r:id="rId14"/>
   </p:sldIdLst>
   <p:sldSz cx="10077450" cy="5668963"/>
   <p:notesSz cx="7559675" cy="10691813"/>
@@ -72,7 +73,7 @@
         <p:txBody>
           <a:bodyPr/>
           <a:p>
-            <a:fld id="{5669E41B-D5CD-4AD6-8082-CA2119CBB203}" type="slidenum">
+            <a:fld id="{C88D712A-5814-465D-8FA2-034235C3DDC8}" type="slidenum">
               <a:t>&lt;#&gt;</a:t>
             </a:fld>
           </a:p>
@@ -133,8 +134,8 @@
         </p:nvSpPr>
         <p:spPr>
           <a:xfrm>
-            <a:off x="503640" y="225720"/>
-            <a:ext cx="9066240" cy="944280"/>
+            <a:off x="503640" y="226080"/>
+            <a:ext cx="9069120" cy="946080"/>
           </a:xfrm>
           <a:prstGeom prst="rect">
             <a:avLst/>
@@ -260,7 +261,7 @@
         <p:txBody>
           <a:bodyPr/>
           <a:p>
-            <a:fld id="{730C8876-39BE-4A2E-B0EA-8786AF0DCC7A}" type="slidenum">
+            <a:fld id="{79E88393-3504-4C27-A05C-5AF5BCC3C7E2}" type="slidenum">
               <a:t>&lt;#&gt;</a:t>
             </a:fld>
           </a:p>
@@ -321,8 +322,8 @@
         </p:nvSpPr>
         <p:spPr>
           <a:xfrm>
-            <a:off x="503640" y="225720"/>
-            <a:ext cx="9066240" cy="944280"/>
+            <a:off x="503640" y="226080"/>
+            <a:ext cx="9069120" cy="946080"/>
           </a:xfrm>
           <a:prstGeom prst="rect">
             <a:avLst/>
@@ -516,7 +517,7 @@
         <p:txBody>
           <a:bodyPr/>
           <a:p>
-            <a:fld id="{6D29EEFA-5A8B-4A08-8504-A9AB415F096A}" type="slidenum">
+            <a:fld id="{ED4447AD-CF4F-485A-983D-B6DA365FFA45}" type="slidenum">
               <a:t>&lt;#&gt;</a:t>
             </a:fld>
           </a:p>
@@ -577,8 +578,8 @@
         </p:nvSpPr>
         <p:spPr>
           <a:xfrm>
-            <a:off x="503640" y="225720"/>
-            <a:ext cx="9066240" cy="944280"/>
+            <a:off x="503640" y="226080"/>
+            <a:ext cx="9069120" cy="946080"/>
           </a:xfrm>
           <a:prstGeom prst="rect">
             <a:avLst/>
@@ -840,7 +841,7 @@
         <p:txBody>
           <a:bodyPr/>
           <a:p>
-            <a:fld id="{72580C91-7FDC-42B1-A34D-749E61D04E07}" type="slidenum">
+            <a:fld id="{15FA2B45-7CDD-4B42-9F26-7B7B30275123}" type="slidenum">
               <a:t>&lt;#&gt;</a:t>
             </a:fld>
           </a:p>
@@ -901,8 +902,8 @@
         </p:nvSpPr>
         <p:spPr>
           <a:xfrm>
-            <a:off x="503640" y="225720"/>
-            <a:ext cx="9066240" cy="944280"/>
+            <a:off x="503640" y="226080"/>
+            <a:ext cx="9069120" cy="946080"/>
           </a:xfrm>
           <a:prstGeom prst="rect">
             <a:avLst/>
@@ -997,7 +998,7 @@
         <p:txBody>
           <a:bodyPr/>
           <a:p>
-            <a:fld id="{AFADF256-7FC5-4EDD-B2FA-1AFD46748ABB}" type="slidenum">
+            <a:fld id="{BA885195-1EAA-42F6-852F-48D41C751AE7}" type="slidenum">
               <a:t>&lt;#&gt;</a:t>
             </a:fld>
           </a:p>
@@ -1058,8 +1059,8 @@
         </p:nvSpPr>
         <p:spPr>
           <a:xfrm>
-            <a:off x="503640" y="225720"/>
-            <a:ext cx="9066240" cy="944280"/>
+            <a:off x="503640" y="226080"/>
+            <a:ext cx="9069120" cy="946080"/>
           </a:xfrm>
           <a:prstGeom prst="rect">
             <a:avLst/>
@@ -1151,7 +1152,7 @@
         <p:txBody>
           <a:bodyPr/>
           <a:p>
-            <a:fld id="{9ED23F3B-2047-450B-B05F-CF8DFEC005D5}" type="slidenum">
+            <a:fld id="{A766E48D-E911-4694-AA23-E60AC47EE957}" type="slidenum">
               <a:t>&lt;#&gt;</a:t>
             </a:fld>
           </a:p>
@@ -1212,8 +1213,8 @@
         </p:nvSpPr>
         <p:spPr>
           <a:xfrm>
-            <a:off x="503640" y="225720"/>
-            <a:ext cx="9066240" cy="944280"/>
+            <a:off x="503640" y="226080"/>
+            <a:ext cx="9069120" cy="946080"/>
           </a:xfrm>
           <a:prstGeom prst="rect">
             <a:avLst/>
@@ -1339,7 +1340,7 @@
         <p:txBody>
           <a:bodyPr/>
           <a:p>
-            <a:fld id="{1AF330A8-2B73-47B2-9C32-F5514C458C00}" type="slidenum">
+            <a:fld id="{6ABCD6BC-C467-4DFA-BC33-806A47A478E3}" type="slidenum">
               <a:t>&lt;#&gt;</a:t>
             </a:fld>
           </a:p>
@@ -1400,8 +1401,8 @@
         </p:nvSpPr>
         <p:spPr>
           <a:xfrm>
-            <a:off x="503640" y="225720"/>
-            <a:ext cx="9066240" cy="944280"/>
+            <a:off x="503640" y="226080"/>
+            <a:ext cx="9069120" cy="946080"/>
           </a:xfrm>
           <a:prstGeom prst="rect">
             <a:avLst/>
@@ -1459,7 +1460,7 @@
         <p:txBody>
           <a:bodyPr/>
           <a:p>
-            <a:fld id="{CACB3A11-0886-4396-B1FC-380982C934E2}" type="slidenum">
+            <a:fld id="{266FE0FC-29F7-4284-9D4B-405A71C26062}" type="slidenum">
               <a:t>&lt;#&gt;</a:t>
             </a:fld>
           </a:p>
@@ -1520,8 +1521,8 @@
         </p:nvSpPr>
         <p:spPr>
           <a:xfrm>
-            <a:off x="503640" y="225720"/>
-            <a:ext cx="9066240" cy="4378320"/>
+            <a:off x="503640" y="226080"/>
+            <a:ext cx="9069120" cy="4386600"/>
           </a:xfrm>
           <a:prstGeom prst="rect">
             <a:avLst/>
@@ -1579,7 +1580,7 @@
         <p:txBody>
           <a:bodyPr/>
           <a:p>
-            <a:fld id="{52B934E8-2B34-484C-A1C1-43A4528BECA9}" type="slidenum">
+            <a:fld id="{3A2D558A-B932-42AF-86AF-FFF665C2C4DE}" type="slidenum">
               <a:t>&lt;#&gt;</a:t>
             </a:fld>
           </a:p>
@@ -1640,8 +1641,8 @@
         </p:nvSpPr>
         <p:spPr>
           <a:xfrm>
-            <a:off x="503640" y="225720"/>
-            <a:ext cx="9066240" cy="944280"/>
+            <a:off x="503640" y="226080"/>
+            <a:ext cx="9069120" cy="946080"/>
           </a:xfrm>
           <a:prstGeom prst="rect">
             <a:avLst/>
@@ -1801,7 +1802,7 @@
         <p:txBody>
           <a:bodyPr/>
           <a:p>
-            <a:fld id="{C2C02360-D7D8-4510-9A14-2FCA9820358F}" type="slidenum">
+            <a:fld id="{51FAE624-8D44-43F2-BA67-DAECE90A55F0}" type="slidenum">
               <a:t>&lt;#&gt;</a:t>
             </a:fld>
           </a:p>
@@ -1862,8 +1863,8 @@
         </p:nvSpPr>
         <p:spPr>
           <a:xfrm>
-            <a:off x="503640" y="225720"/>
-            <a:ext cx="9066240" cy="944280"/>
+            <a:off x="503640" y="226080"/>
+            <a:ext cx="9069120" cy="946080"/>
           </a:xfrm>
           <a:prstGeom prst="rect">
             <a:avLst/>
@@ -2023,7 +2024,7 @@
         <p:txBody>
           <a:bodyPr/>
           <a:p>
-            <a:fld id="{5BAD7330-F15B-4742-8B3C-9C8AE64E351C}" type="slidenum">
+            <a:fld id="{F253705F-255C-4A5F-A001-C9775C0404F1}" type="slidenum">
               <a:t>&lt;#&gt;</a:t>
             </a:fld>
           </a:p>
@@ -2084,8 +2085,8 @@
         </p:nvSpPr>
         <p:spPr>
           <a:xfrm>
-            <a:off x="503640" y="225720"/>
-            <a:ext cx="9066240" cy="944280"/>
+            <a:off x="503640" y="226080"/>
+            <a:ext cx="9069120" cy="946080"/>
           </a:xfrm>
           <a:prstGeom prst="rect">
             <a:avLst/>
@@ -2245,7 +2246,7 @@
         <p:txBody>
           <a:bodyPr/>
           <a:p>
-            <a:fld id="{53E84026-55CF-4ED3-946A-1FB71335A352}" type="slidenum">
+            <a:fld id="{8D38BD88-0B42-4A0C-9C28-5C8603240E8C}" type="slidenum">
               <a:t>&lt;#&gt;</a:t>
             </a:fld>
           </a:p>
@@ -2282,10 +2283,17 @@
   <p:cSld>
     <p:bg>
       <p:bgPr>
-        <a:blipFill rotWithShape="0">
-          <a:blip r:embed="rId2"/>
-          <a:stretch/>
-        </a:blipFill>
+        <a:gradFill rotWithShape="0">
+          <a:gsLst>
+            <a:gs pos="0">
+              <a:srgbClr val="ffd428"/>
+            </a:gs>
+            <a:gs pos="100000">
+              <a:srgbClr val="fff5ce"/>
+            </a:gs>
+          </a:gsLst>
+          <a:lin ang="3600000"/>
+        </a:gradFill>
       </p:bgPr>
     </p:bg>
     <p:spTree>
@@ -2309,53 +2317,13 @@
             <a:spLocks noGrp="1"/>
           </p:cNvSpPr>
           <p:nvPr>
-            <p:ph type="title"/>
-          </p:nvPr>
-        </p:nvSpPr>
-        <p:spPr>
-          <a:xfrm>
-            <a:off x="503640" y="225720"/>
-            <a:ext cx="9066240" cy="944280"/>
-          </a:xfrm>
-          <a:prstGeom prst="rect">
-            <a:avLst/>
-          </a:prstGeom>
-          <a:noFill/>
-          <a:ln w="0">
-            <a:noFill/>
-          </a:ln>
-        </p:spPr>
-        <p:txBody>
-          <a:bodyPr lIns="0" rIns="0" tIns="0" bIns="0" anchor="ctr">
-            <a:noAutofit/>
-          </a:bodyPr>
-          <a:p>
-            <a:r>
-              <a:rPr b="0" lang="en-US" sz="1800" spc="-1" strike="noStrike">
-                <a:latin typeface="Arial"/>
-              </a:rPr>
-              <a:t>Click to edit the title text format</a:t>
-            </a:r>
-            <a:endParaRPr b="0" lang="en-US" sz="1800" spc="-1" strike="noStrike">
-              <a:latin typeface="Arial"/>
-            </a:endParaRPr>
-          </a:p>
-        </p:txBody>
-      </p:sp>
-      <p:sp>
-        <p:nvSpPr>
-          <p:cNvPr id="1" name="PlaceHolder 2"/>
-          <p:cNvSpPr>
-            <a:spLocks noGrp="1"/>
-          </p:cNvSpPr>
-          <p:nvPr>
             <p:ph type="ftr" idx="1"/>
           </p:nvPr>
         </p:nvSpPr>
         <p:spPr>
           <a:xfrm>
-            <a:off x="3445920" y="5163840"/>
-            <a:ext cx="3192120" cy="388800"/>
+            <a:off x="3445560" y="5163840"/>
+            <a:ext cx="3191040" cy="388080"/>
           </a:xfrm>
           <a:prstGeom prst="rect">
             <a:avLst/>
@@ -2401,7 +2369,7 @@
       </p:sp>
       <p:sp>
         <p:nvSpPr>
-          <p:cNvPr id="2" name="PlaceHolder 3"/>
+          <p:cNvPr id="1" name="PlaceHolder 2"/>
           <p:cNvSpPr>
             <a:spLocks noGrp="1"/>
           </p:cNvSpPr>
@@ -2411,8 +2379,8 @@
         </p:nvSpPr>
         <p:spPr>
           <a:xfrm>
-            <a:off x="7224480" y="5163840"/>
-            <a:ext cx="2345400" cy="388800"/>
+            <a:off x="7223760" y="5163840"/>
+            <a:ext cx="2344680" cy="388080"/>
           </a:xfrm>
           <a:prstGeom prst="rect">
             <a:avLst/>
@@ -2444,7 +2412,7 @@
               </a:lnSpc>
               <a:buNone/>
             </a:pPr>
-            <a:fld id="{92F16C21-F647-4678-A50B-3CF1B3569100}" type="slidenum">
+            <a:fld id="{60C9CBCE-7390-445B-BDDA-988889CE5DC1}" type="slidenum">
               <a:rPr b="0" lang="en-US" sz="1400" spc="-1" strike="noStrike">
                 <a:latin typeface="Times New Roman"/>
               </a:rPr>
@@ -2458,7 +2426,7 @@
       </p:sp>
       <p:sp>
         <p:nvSpPr>
-          <p:cNvPr id="3" name="PlaceHolder 4"/>
+          <p:cNvPr id="2" name="PlaceHolder 3"/>
           <p:cNvSpPr>
             <a:spLocks noGrp="1"/>
           </p:cNvSpPr>
@@ -2468,8 +2436,8 @@
         </p:nvSpPr>
         <p:spPr>
           <a:xfrm>
-            <a:off x="503640" y="5163840"/>
-            <a:ext cx="2345400" cy="388800"/>
+            <a:off x="503280" y="5163840"/>
+            <a:ext cx="2344680" cy="388080"/>
           </a:xfrm>
           <a:prstGeom prst="rect">
             <a:avLst/>
@@ -2505,6 +2473,49 @@
       </p:sp>
       <p:sp>
         <p:nvSpPr>
+          <p:cNvPr id="3" name="PlaceHolder 4"/>
+          <p:cNvSpPr>
+            <a:spLocks noGrp="1"/>
+          </p:cNvSpPr>
+          <p:nvPr>
+            <p:ph type="title"/>
+          </p:nvPr>
+        </p:nvSpPr>
+        <p:spPr>
+          <a:xfrm>
+            <a:off x="503640" y="226080"/>
+            <a:ext cx="9069120" cy="946080"/>
+          </a:xfrm>
+          <a:prstGeom prst="rect">
+            <a:avLst/>
+          </a:prstGeom>
+          <a:noFill/>
+          <a:ln w="0">
+            <a:noFill/>
+          </a:ln>
+        </p:spPr>
+        <p:txBody>
+          <a:bodyPr lIns="0" rIns="0" tIns="0" bIns="0" anchor="ctr">
+            <a:noAutofit/>
+          </a:bodyPr>
+          <a:p>
+            <a:pPr algn="ctr">
+              <a:buNone/>
+            </a:pPr>
+            <a:r>
+              <a:rPr b="0" lang="en-US" sz="4400" spc="-1" strike="noStrike">
+                <a:latin typeface="Arial"/>
+              </a:rPr>
+              <a:t>Click to edit the title text format</a:t>
+            </a:r>
+            <a:endParaRPr b="0" lang="en-US" sz="4400" spc="-1" strike="noStrike">
+              <a:latin typeface="Arial"/>
+            </a:endParaRPr>
+          </a:p>
+        </p:txBody>
+      </p:sp>
+      <p:sp>
+        <p:nvSpPr>
           <p:cNvPr id="4" name="PlaceHolder 5"/>
           <p:cNvSpPr>
             <a:spLocks noGrp="1"/>
@@ -2690,24 +2701,138 @@
   </p:cSld>
   <p:clrMap bg1="lt1" bg2="lt2" tx1="dk1" tx2="dk2" accent1="accent1" accent2="accent2" accent3="accent3" accent4="accent4" accent5="accent5" accent6="accent6" hlink="hlink" folHlink="folHlink"/>
   <p:sldLayoutIdLst>
-    <p:sldLayoutId id="2147483649" r:id="rId3"/>
-    <p:sldLayoutId id="2147483650" r:id="rId4"/>
-    <p:sldLayoutId id="2147483651" r:id="rId5"/>
-    <p:sldLayoutId id="2147483652" r:id="rId6"/>
-    <p:sldLayoutId id="2147483653" r:id="rId7"/>
-    <p:sldLayoutId id="2147483654" r:id="rId8"/>
-    <p:sldLayoutId id="2147483655" r:id="rId9"/>
-    <p:sldLayoutId id="2147483656" r:id="rId10"/>
-    <p:sldLayoutId id="2147483657" r:id="rId11"/>
-    <p:sldLayoutId id="2147483658" r:id="rId12"/>
-    <p:sldLayoutId id="2147483659" r:id="rId13"/>
-    <p:sldLayoutId id="2147483660" r:id="rId14"/>
+    <p:sldLayoutId id="2147483649" r:id="rId2"/>
+    <p:sldLayoutId id="2147483650" r:id="rId3"/>
+    <p:sldLayoutId id="2147483651" r:id="rId4"/>
+    <p:sldLayoutId id="2147483652" r:id="rId5"/>
+    <p:sldLayoutId id="2147483653" r:id="rId6"/>
+    <p:sldLayoutId id="2147483654" r:id="rId7"/>
+    <p:sldLayoutId id="2147483655" r:id="rId8"/>
+    <p:sldLayoutId id="2147483656" r:id="rId9"/>
+    <p:sldLayoutId id="2147483657" r:id="rId10"/>
+    <p:sldLayoutId id="2147483658" r:id="rId11"/>
+    <p:sldLayoutId id="2147483659" r:id="rId12"/>
+    <p:sldLayoutId id="2147483660" r:id="rId13"/>
   </p:sldLayoutIdLst>
 </p:sldMaster>
 </file>
 
 <file path=ppt/slides/slide1.xml><?xml version="1.0" encoding="utf-8"?>
 <p:sld xmlns:a="http://schemas.openxmlformats.org/drawingml/2006/main" xmlns:mc="http://schemas.openxmlformats.org/markup-compatibility/2006" xmlns:p="http://schemas.openxmlformats.org/presentationml/2006/main" xmlns:p14="http://schemas.microsoft.com/office/powerpoint/2010/main" xmlns:p15="http://schemas.microsoft.com/office/powerpoint/2012/main" xmlns:r="http://schemas.openxmlformats.org/officeDocument/2006/relationships">
+  <p:cSld>
+    <p:bg>
+      <p:bgPr>
+        <a:gradFill rotWithShape="0">
+          <a:gsLst>
+            <a:gs pos="0">
+              <a:srgbClr val="fff5ce"/>
+            </a:gs>
+            <a:gs pos="67000">
+              <a:srgbClr val="ffd428"/>
+            </a:gs>
+            <a:gs pos="100000">
+              <a:srgbClr val="ffd428"/>
+            </a:gs>
+          </a:gsLst>
+          <a:path path="circle">
+            <a:fillToRect b="67000" l="66000" r="34000" t="33000"/>
+          </a:path>
+        </a:gradFill>
+      </p:bgPr>
+    </p:bg>
+    <p:spTree>
+      <p:nvGrpSpPr>
+        <p:cNvPr id="1" name=""/>
+        <p:cNvGrpSpPr/>
+        <p:nvPr/>
+      </p:nvGrpSpPr>
+      <p:grpSpPr>
+        <a:xfrm>
+          <a:off x="0" y="0"/>
+          <a:ext cx="0" cy="0"/>
+          <a:chOff x="0" y="0"/>
+          <a:chExt cx="0" cy="0"/>
+        </a:xfrm>
+      </p:grpSpPr>
+      <p:sp>
+        <p:nvSpPr>
+          <p:cNvPr name="TextBox 2" id="2"/>
+          <p:cNvSpPr txBox="true"/>
+          <p:nvPr>
+            <p:ph type="title"/>
+          </p:nvPr>
+        </p:nvSpPr>
+        <p:spPr>
+          <a:xfrm>
+            <a:off x="635000" y="635000"/>
+            <a:ext cx="8890000" cy="1270000"/>
+          </a:xfrm>
+          <a:prstGeom prst="rect">
+            <a:avLst/>
+          </a:prstGeom>
+        </p:spPr>
+        <p:txBody>
+          <a:bodyPr anchor="t" rtlCol="false"/>
+          <a:lstStyle/>
+          <a:p>
+            <a:pPr algn="l">
+              <a:defRPr/>
+            </a:pPr>
+            <a:r>
+              <a:rPr lang="en-US"/>
+              <a:t>Generate PPTX presentation from code</a:t>
+            </a:r>
+            <a:endParaRPr lang="en-US"/>
+          </a:p>
+        </p:txBody>
+      </p:sp>
+      <p:sp>
+        <p:nvSpPr>
+          <p:cNvPr name="TextBox 3" id="3"/>
+          <p:cNvSpPr txBox="true"/>
+          <p:nvPr>
+            <p:ph type="subTitle"/>
+          </p:nvPr>
+        </p:nvSpPr>
+        <p:spPr>
+          <a:xfrm>
+            <a:off x="3175000" y="3810000"/>
+            <a:ext cx="6350000" cy="1270000"/>
+          </a:xfrm>
+          <a:prstGeom prst="rect">
+            <a:avLst/>
+          </a:prstGeom>
+        </p:spPr>
+        <p:txBody>
+          <a:bodyPr anchor="t" rtlCol="false"/>
+          <a:lstStyle/>
+          <a:p>
+            <a:pPr algn="l">
+              <a:defRPr/>
+            </a:pPr>
+            <a:r>
+              <a:rPr lang="en-US"/>
+              <a:t>Jacek Kowalczyk 2024-04-25</a:t>
+            </a:r>
+            <a:endParaRPr lang="en-US"/>
+          </a:p>
+        </p:txBody>
+      </p:sp>
+    </p:spTree>
+  </p:cSld>
+  <mc:AlternateContent>
+    <mc:Choice Requires="p14">
+      <p:transition p14:dur="2000" spd="slow"/>
+    </mc:Choice>
+    <mc:Fallback>
+      <p:transition spd="slow"/>
+    </mc:Fallback>
+  </mc:AlternateContent>
+</p:sld>
+</file>
+
+<file path=ppt/slides/slide10.xml><?xml version="1.0" encoding="utf-8"?>
+<p:sld xmlns:p="http://schemas.openxmlformats.org/presentationml/2006/main" xmlns:a="http://schemas.openxmlformats.org/drawingml/2006/main">
   <p:cSld>
     <p:spTree>
       <p:nvGrpSpPr>
@@ -2733,8 +2858,8 @@
         </p:nvSpPr>
         <p:spPr>
           <a:xfrm>
-            <a:off x="635000" y="635000"/>
-            <a:ext cx="8890000" cy="1270000"/>
+            <a:off x="635000" y="381000"/>
+            <a:ext cx="8890000" cy="1016000"/>
           </a:xfrm>
           <a:prstGeom prst="rect">
             <a:avLst/>
@@ -2749,7 +2874,7 @@
             </a:pPr>
             <a:r>
               <a:rPr lang="en-US"/>
-              <a:t>Generate PPTX presentation from code</a:t>
+              <a:t>You can have empty slides</a:t>
             </a:r>
             <a:endParaRPr lang="en-US"/>
           </a:p>
@@ -2760,13 +2885,13 @@
           <p:cNvPr name="TextBox 3" id="3"/>
           <p:cNvSpPr txBox="true"/>
           <p:nvPr>
-            <p:ph type="subTitle"/>
-          </p:nvPr>
-        </p:nvSpPr>
-        <p:spPr>
-          <a:xfrm>
-            <a:off x="2540000" y="2540000"/>
-            <a:ext cx="6350000" cy="1270000"/>
+            <p:ph type="obj"/>
+          </p:nvPr>
+        </p:nvSpPr>
+        <p:spPr>
+          <a:xfrm>
+            <a:off x="635000" y="1270000"/>
+            <a:ext cx="8636000" cy="3810000"/>
           </a:xfrm>
           <a:prstGeom prst="rect">
             <a:avLst/>
@@ -2776,31 +2901,61 @@
           <a:bodyPr anchor="t" rtlCol="false"/>
           <a:lstStyle/>
           <a:p>
+            <a:r>
+              <a:rPr lang="en-US" sz="1800"/>
+              <a:t>The next slide will be empty</a:t>
+            </a:r>
+          </a:p>
+        </p:txBody>
+      </p:sp>
+      <p:sp>
+        <p:nvSpPr>
+          <p:cNvPr name="TextBox 4" id="4"/>
+          <p:cNvSpPr txBox="true"/>
+          <p:nvPr>
+            <p:ph type="ftr"/>
+          </p:nvPr>
+        </p:nvSpPr>
+        <p:spPr>
+          <a:xfrm>
+            <a:off x="5715000" y="5080000"/>
+            <a:ext cx="3810000" cy="508000"/>
+          </a:xfrm>
+          <a:prstGeom prst="rect">
+            <a:avLst/>
+          </a:prstGeom>
+        </p:spPr>
+        <p:txBody>
+          <a:bodyPr anchor="t" rtlCol="false"/>
+          <a:lstStyle/>
+          <a:p>
             <a:pPr algn="l">
               <a:defRPr/>
             </a:pPr>
             <a:r>
               <a:rPr lang="en-US"/>
-              <a:t>Jacek Kowalczyk 2024-04-25</a:t>
-            </a:r>
-            <a:endParaRPr lang="en-US"/>
+              <a:t/>
+            </a:r>
+            <a:endParaRPr lang="en-US" sz="1100"/>
+          </a:p>
+          <a:p>
+            <a:pPr lvl="0"/>
+            <a:r>
+              <a:rPr lang="en-US" sz="1400"/>
+              <a:t>2024-05-08         JacekKowalczyk82.org               9</a:t>
+            </a:r>
           </a:p>
         </p:txBody>
       </p:sp>
     </p:spTree>
   </p:cSld>
-  <mc:AlternateContent>
-    <mc:Choice Requires="p14">
-      <p:transition p14:dur="2000" spd="slow"/>
-    </mc:Choice>
-    <mc:Fallback>
-      <p:transition spd="slow"/>
-    </mc:Fallback>
-  </mc:AlternateContent>
+  <p:clrMapOvr>
+    <a:masterClrMapping/>
+  </p:clrMapOvr>
 </p:sld>
 </file>
 
-<file path=ppt/slides/slide10.xml><?xml version="1.0" encoding="utf-8"?>
+<file path=ppt/slides/slide11.xml><?xml version="1.0" encoding="utf-8"?>
 <p:sld xmlns:p="http://schemas.openxmlformats.org/presentationml/2006/main" xmlns:a="http://schemas.openxmlformats.org/drawingml/2006/main">
   <p:cSld>
     <p:spTree>
@@ -2900,7 +3055,7 @@
               <a:buChar char="•"/>
             </a:pPr>
             <a:r>
-              <a:rPr lang="en-US" sz="1400"/>
+              <a:rPr lang="en-US" sz="1800"/>
               <a:t>curl -s "https://get.sdkman.io" | bash</a:t>
             </a:r>
           </a:p>
@@ -2910,7 +3065,7 @@
               <a:buChar char="•"/>
             </a:pPr>
             <a:r>
-              <a:rPr lang="en-US" sz="1400"/>
+              <a:rPr lang="en-US" sz="1800"/>
               <a:t>source "/home/ubuntu/.sdkman/bin/sdkman-init.sh"</a:t>
             </a:r>
           </a:p>
@@ -2920,7 +3075,7 @@
               <a:buChar char="•"/>
             </a:pPr>
             <a:r>
-              <a:rPr lang="en-US" sz="1400"/>
+              <a:rPr lang="en-US" sz="1800"/>
               <a:t>sdk install gradle</a:t>
             </a:r>
           </a:p>
@@ -2930,7 +3085,7 @@
               <a:buChar char="•"/>
             </a:pPr>
             <a:r>
-              <a:rPr lang="en-US" sz="1400"/>
+              <a:rPr lang="en-US" sz="1800"/>
               <a:t>sdk install java 11.0.22-tem</a:t>
             </a:r>
           </a:p>
@@ -2940,7 +3095,7 @@
               <a:buChar char="•"/>
             </a:pPr>
             <a:r>
-              <a:rPr lang="en-US" sz="1400"/>
+              <a:rPr lang="en-US" sz="1800"/>
               <a:t>gradle init</a:t>
             </a:r>
           </a:p>
@@ -2956,7 +3111,7 @@
         </p:nvSpPr>
         <p:spPr>
           <a:xfrm>
-            <a:off x="5080000" y="5080000"/>
+            <a:off x="5715000" y="5080000"/>
             <a:ext cx="3810000" cy="508000"/>
           </a:xfrm>
           <a:prstGeom prst="rect">
@@ -2972,9 +3127,16 @@
             </a:pPr>
             <a:r>
               <a:rPr lang="en-US"/>
-              <a:t>2024-04-26         JacekKowalczyk82.org               1</a:t>
-            </a:r>
-            <a:endParaRPr lang="en-US"/>
+              <a:t/>
+            </a:r>
+            <a:endParaRPr lang="en-US" sz="1100"/>
+          </a:p>
+          <a:p>
+            <a:pPr lvl="0"/>
+            <a:r>
+              <a:rPr lang="en-US" sz="1400"/>
+              <a:t>2024-05-08         JacekKowalczyk82.org               1</a:t>
+            </a:r>
           </a:p>
         </p:txBody>
       </p:sp>
@@ -3061,7 +3223,7 @@
               <a:buChar char="•"/>
             </a:pPr>
             <a:r>
-              <a:rPr lang="en-US" sz="1400"/>
+              <a:rPr lang="en-US" sz="1800"/>
               <a:t>https://www.baeldung.com/apache-poi-slideshow</a:t>
             </a:r>
           </a:p>
@@ -3071,7 +3233,7 @@
               <a:buChar char="•"/>
             </a:pPr>
             <a:r>
-              <a:rPr lang="en-US" sz="1400"/>
+              <a:rPr lang="en-US" sz="1800"/>
               <a:t>shttps://poi.apache.org/components/slideshow/xslf-cookbook.html</a:t>
             </a:r>
           </a:p>
@@ -3081,7 +3243,7 @@
               <a:buChar char="•"/>
             </a:pPr>
             <a:r>
-              <a:rPr lang="en-US" sz="1400"/>
+              <a:rPr lang="en-US" sz="1800"/>
               <a:t>https://github.com/eugenp/tutorials/blob/master/apache-poi-2/src/main/java/com/baeldung/poi/powerpoint/PowerPointHelper.java</a:t>
             </a:r>
           </a:p>
@@ -3097,7 +3259,7 @@
         </p:nvSpPr>
         <p:spPr>
           <a:xfrm>
-            <a:off x="5080000" y="5080000"/>
+            <a:off x="5715000" y="5080000"/>
             <a:ext cx="3810000" cy="508000"/>
           </a:xfrm>
           <a:prstGeom prst="rect">
@@ -3113,9 +3275,16 @@
             </a:pPr>
             <a:r>
               <a:rPr lang="en-US"/>
-              <a:t>2024-04-26         JacekKowalczyk82.org               2</a:t>
-            </a:r>
-            <a:endParaRPr lang="en-US"/>
+              <a:t/>
+            </a:r>
+            <a:endParaRPr lang="en-US" sz="1100"/>
+          </a:p>
+          <a:p>
+            <a:pPr lvl="0"/>
+            <a:r>
+              <a:rPr lang="en-US" sz="1400"/>
+              <a:t>2024-05-08         JacekKowalczyk82.org               2</a:t>
+            </a:r>
           </a:p>
         </p:txBody>
       </p:sp>
@@ -3198,7 +3367,7 @@
           <a:lstStyle/>
           <a:p>
             <a:r>
-              <a:rPr lang="en-US" sz="1400">
+              <a:rPr lang="en-US" sz="1800">
                 <a:solidFill>
                   <a:srgbClr val="808080"/>
                 </a:solidFill>
@@ -3222,7 +3391,7 @@
         </p:nvSpPr>
         <p:spPr>
           <a:xfrm>
-            <a:off x="5080000" y="5080000"/>
+            <a:off x="5715000" y="5080000"/>
             <a:ext cx="3810000" cy="508000"/>
           </a:xfrm>
           <a:prstGeom prst="rect">
@@ -3238,9 +3407,16 @@
             </a:pPr>
             <a:r>
               <a:rPr lang="en-US"/>
-              <a:t>2024-04-26         JacekKowalczyk82.org               3</a:t>
-            </a:r>
-            <a:endParaRPr lang="en-US"/>
+              <a:t/>
+            </a:r>
+            <a:endParaRPr lang="en-US" sz="1100"/>
+          </a:p>
+          <a:p>
+            <a:pPr lvl="0"/>
+            <a:r>
+              <a:rPr lang="en-US" sz="1400"/>
+              <a:t>2024-05-08         JacekKowalczyk82.org               3</a:t>
+            </a:r>
           </a:p>
         </p:txBody>
       </p:sp>
@@ -3348,7 +3524,7 @@
           <a:lstStyle/>
           <a:p>
             <a:r>
-              <a:rPr lang="en-US" sz="1400">
+              <a:rPr lang="en-US" sz="1800">
                 <a:solidFill>
                   <a:srgbClr val="808080"/>
                 </a:solidFill>
@@ -3374,7 +3550,7 @@
         </p:nvSpPr>
         <p:spPr>
           <a:xfrm>
-            <a:off x="5080000" y="5080000"/>
+            <a:off x="5715000" y="5080000"/>
             <a:ext cx="3810000" cy="508000"/>
           </a:xfrm>
           <a:prstGeom prst="rect">
@@ -3390,9 +3566,16 @@
             </a:pPr>
             <a:r>
               <a:rPr lang="en-US"/>
-              <a:t>2024-04-26         JacekKowalczyk82.org               5</a:t>
-            </a:r>
-            <a:endParaRPr lang="en-US"/>
+              <a:t/>
+            </a:r>
+            <a:endParaRPr lang="en-US" sz="1100"/>
+          </a:p>
+          <a:p>
+            <a:pPr lvl="0"/>
+            <a:r>
+              <a:rPr lang="en-US" sz="1400"/>
+              <a:t>2024-05-08         JacekKowalczyk82.org               5</a:t>
+            </a:r>
           </a:p>
         </p:txBody>
       </p:sp>
@@ -3475,7 +3658,7 @@
           <a:lstStyle/>
           <a:p>
             <a:r>
-              <a:rPr lang="en-US" sz="1400"/>
+              <a:rPr lang="en-US" sz="1800"/>
               <a:t>this is a paragraph text on the slide 2</a:t>
             </a:r>
           </a:p>
@@ -3491,7 +3674,7 @@
         </p:nvSpPr>
         <p:spPr>
           <a:xfrm>
-            <a:off x="5080000" y="5080000"/>
+            <a:off x="5715000" y="5080000"/>
             <a:ext cx="3810000" cy="508000"/>
           </a:xfrm>
           <a:prstGeom prst="rect">
@@ -3507,9 +3690,16 @@
             </a:pPr>
             <a:r>
               <a:rPr lang="en-US"/>
-              <a:t>2024-04-26         JacekKowalczyk82.org               6</a:t>
-            </a:r>
-            <a:endParaRPr lang="en-US"/>
+              <a:t/>
+            </a:r>
+            <a:endParaRPr lang="en-US" sz="1100"/>
+          </a:p>
+          <a:p>
+            <a:pPr lvl="0"/>
+            <a:r>
+              <a:rPr lang="en-US" sz="1400"/>
+              <a:t>2024-05-08         JacekKowalczyk82.org               6</a:t>
+            </a:r>
           </a:p>
         </p:txBody>
       </p:sp>
@@ -3596,7 +3786,7 @@
               <a:buChar char="•"/>
             </a:pPr>
             <a:r>
-              <a:rPr lang="en-US" sz="1400"/>
+              <a:rPr lang="en-US" sz="1800"/>
               <a:t>Element 1 </a:t>
             </a:r>
           </a:p>
@@ -3606,7 +3796,7 @@
               <a:buChar char="•"/>
             </a:pPr>
             <a:r>
-              <a:rPr lang="en-US" sz="1400"/>
+              <a:rPr lang="en-US" sz="1800"/>
               <a:t>Element 2</a:t>
             </a:r>
           </a:p>
@@ -3616,7 +3806,7 @@
               <a:buChar char="•"/>
             </a:pPr>
             <a:r>
-              <a:rPr lang="en-US" sz="1400"/>
+              <a:rPr lang="en-US" sz="1800"/>
               <a:t>Element 3</a:t>
             </a:r>
           </a:p>
@@ -3632,7 +3822,7 @@
         </p:nvSpPr>
         <p:spPr>
           <a:xfrm>
-            <a:off x="5080000" y="5080000"/>
+            <a:off x="5715000" y="5080000"/>
             <a:ext cx="3810000" cy="508000"/>
           </a:xfrm>
           <a:prstGeom prst="rect">
@@ -3648,9 +3838,16 @@
             </a:pPr>
             <a:r>
               <a:rPr lang="en-US"/>
-              <a:t>2024-04-26         JacekKowalczyk82.org               7</a:t>
-            </a:r>
-            <a:endParaRPr lang="en-US"/>
+              <a:t/>
+            </a:r>
+            <a:endParaRPr lang="en-US" sz="1100"/>
+          </a:p>
+          <a:p>
+            <a:pPr lvl="0"/>
+            <a:r>
+              <a:rPr lang="en-US" sz="1400"/>
+              <a:t>2024-05-08         JacekKowalczyk82.org               7</a:t>
+            </a:r>
           </a:p>
         </p:txBody>
       </p:sp>
@@ -3705,7 +3902,7 @@
             </a:pPr>
             <a:r>
               <a:rPr lang="en-US"/>
-              <a:t>You can have empty slides</a:t>
+              <a:t>Slide with Numbered List</a:t>
             </a:r>
             <a:endParaRPr lang="en-US"/>
           </a:p>
@@ -3732,9 +3929,30 @@
           <a:bodyPr anchor="t" rtlCol="false"/>
           <a:lstStyle/>
           <a:p>
-            <a:r>
-              <a:rPr lang="en-US" sz="1400"/>
-              <a:t>The next slide will be empty</a:t>
+            <a:pPr lvl="0">
+              <a:buAutoNum type="arabicParenR" startAt="1"/>
+            </a:pPr>
+            <a:r>
+              <a:rPr lang="en-US" sz="1800"/>
+              <a:t>Element 1 </a:t>
+            </a:r>
+          </a:p>
+          <a:p>
+            <a:pPr lvl="0">
+              <a:buAutoNum type="arabicParenR" startAt="2"/>
+            </a:pPr>
+            <a:r>
+              <a:rPr lang="en-US" sz="1800"/>
+              <a:t>Element 2</a:t>
+            </a:r>
+          </a:p>
+          <a:p>
+            <a:pPr lvl="0">
+              <a:buAutoNum type="arabicParenR" startAt="3"/>
+            </a:pPr>
+            <a:r>
+              <a:rPr lang="en-US" sz="1800"/>
+              <a:t>Element 3</a:t>
             </a:r>
           </a:p>
         </p:txBody>
@@ -3749,7 +3967,7 @@
         </p:nvSpPr>
         <p:spPr>
           <a:xfrm>
-            <a:off x="5080000" y="5080000"/>
+            <a:off x="5715000" y="5080000"/>
             <a:ext cx="3810000" cy="508000"/>
           </a:xfrm>
           <a:prstGeom prst="rect">
@@ -3765,9 +3983,16 @@
             </a:pPr>
             <a:r>
               <a:rPr lang="en-US"/>
-              <a:t>2024-04-26         JacekKowalczyk82.org               8</a:t>
-            </a:r>
-            <a:endParaRPr lang="en-US"/>
+              <a:t/>
+            </a:r>
+            <a:endParaRPr lang="en-US" sz="1100"/>
+          </a:p>
+          <a:p>
+            <a:pPr lvl="0"/>
+            <a:r>
+              <a:rPr lang="en-US" sz="1400"/>
+              <a:t>2024-05-08         JacekKowalczyk82.org               8</a:t>
+            </a:r>
           </a:p>
         </p:txBody>
       </p:sp>

</xml_diff>